<commit_message>
Use case figure polish
</commit_message>
<xml_diff>
--- a/images/wot-use-cases.pptx
+++ b/images/wot-use-cases.pptx
@@ -296,7 +296,7 @@
             <a:fld id="{D15E2E9D-520B-4AF5-9F19-1A682015C815}" type="datetimeFigureOut">
               <a:rPr kumimoji="1" lang="ja-JP" altLang="en-US" smtClean="0"/>
               <a:pPr/>
-              <a:t>2017/9/4</a:t>
+              <a:t>2017/9/5</a:t>
             </a:fld>
             <a:endParaRPr kumimoji="1" lang="ja-JP" altLang="en-US"/>
           </a:p>
@@ -348,7 +348,7 @@
     </p:spTree>
     <p:extLst>
       <p:ext uri="{BB962C8B-B14F-4D97-AF65-F5344CB8AC3E}">
-        <p14:creationId xmlns:p14="http://schemas.microsoft.com/office/powerpoint/2010/main" xmlns="" val="1192326336"/>
+        <p14:creationId xmlns="" xmlns:p14="http://schemas.microsoft.com/office/powerpoint/2010/main" val="1192326336"/>
       </p:ext>
     </p:extLst>
   </p:cSld>
@@ -468,7 +468,7 @@
             <a:fld id="{D15E2E9D-520B-4AF5-9F19-1A682015C815}" type="datetimeFigureOut">
               <a:rPr kumimoji="1" lang="ja-JP" altLang="en-US" smtClean="0"/>
               <a:pPr/>
-              <a:t>2017/9/4</a:t>
+              <a:t>2017/9/5</a:t>
             </a:fld>
             <a:endParaRPr kumimoji="1" lang="ja-JP" altLang="en-US"/>
           </a:p>
@@ -520,7 +520,7 @@
     </p:spTree>
     <p:extLst>
       <p:ext uri="{BB962C8B-B14F-4D97-AF65-F5344CB8AC3E}">
-        <p14:creationId xmlns:p14="http://schemas.microsoft.com/office/powerpoint/2010/main" xmlns="" val="178783307"/>
+        <p14:creationId xmlns="" xmlns:p14="http://schemas.microsoft.com/office/powerpoint/2010/main" val="178783307"/>
       </p:ext>
     </p:extLst>
   </p:cSld>
@@ -650,7 +650,7 @@
             <a:fld id="{D15E2E9D-520B-4AF5-9F19-1A682015C815}" type="datetimeFigureOut">
               <a:rPr kumimoji="1" lang="ja-JP" altLang="en-US" smtClean="0"/>
               <a:pPr/>
-              <a:t>2017/9/4</a:t>
+              <a:t>2017/9/5</a:t>
             </a:fld>
             <a:endParaRPr kumimoji="1" lang="ja-JP" altLang="en-US"/>
           </a:p>
@@ -702,7 +702,7 @@
     </p:spTree>
     <p:extLst>
       <p:ext uri="{BB962C8B-B14F-4D97-AF65-F5344CB8AC3E}">
-        <p14:creationId xmlns:p14="http://schemas.microsoft.com/office/powerpoint/2010/main" xmlns="" val="2501890022"/>
+        <p14:creationId xmlns="" xmlns:p14="http://schemas.microsoft.com/office/powerpoint/2010/main" val="2501890022"/>
       </p:ext>
     </p:extLst>
   </p:cSld>
@@ -822,7 +822,7 @@
             <a:fld id="{D15E2E9D-520B-4AF5-9F19-1A682015C815}" type="datetimeFigureOut">
               <a:rPr kumimoji="1" lang="ja-JP" altLang="en-US" smtClean="0"/>
               <a:pPr/>
-              <a:t>2017/9/4</a:t>
+              <a:t>2017/9/5</a:t>
             </a:fld>
             <a:endParaRPr kumimoji="1" lang="ja-JP" altLang="en-US"/>
           </a:p>
@@ -874,7 +874,7 @@
     </p:spTree>
     <p:extLst>
       <p:ext uri="{BB962C8B-B14F-4D97-AF65-F5344CB8AC3E}">
-        <p14:creationId xmlns:p14="http://schemas.microsoft.com/office/powerpoint/2010/main" xmlns="" val="3704420177"/>
+        <p14:creationId xmlns="" xmlns:p14="http://schemas.microsoft.com/office/powerpoint/2010/main" val="3704420177"/>
       </p:ext>
     </p:extLst>
   </p:cSld>
@@ -1070,7 +1070,7 @@
             <a:fld id="{D15E2E9D-520B-4AF5-9F19-1A682015C815}" type="datetimeFigureOut">
               <a:rPr kumimoji="1" lang="ja-JP" altLang="en-US" smtClean="0"/>
               <a:pPr/>
-              <a:t>2017/9/4</a:t>
+              <a:t>2017/9/5</a:t>
             </a:fld>
             <a:endParaRPr kumimoji="1" lang="ja-JP" altLang="en-US"/>
           </a:p>
@@ -1122,7 +1122,7 @@
     </p:spTree>
     <p:extLst>
       <p:ext uri="{BB962C8B-B14F-4D97-AF65-F5344CB8AC3E}">
-        <p14:creationId xmlns:p14="http://schemas.microsoft.com/office/powerpoint/2010/main" xmlns="" val="1041084740"/>
+        <p14:creationId xmlns="" xmlns:p14="http://schemas.microsoft.com/office/powerpoint/2010/main" val="1041084740"/>
       </p:ext>
     </p:extLst>
   </p:cSld>
@@ -1360,7 +1360,7 @@
             <a:fld id="{D15E2E9D-520B-4AF5-9F19-1A682015C815}" type="datetimeFigureOut">
               <a:rPr kumimoji="1" lang="ja-JP" altLang="en-US" smtClean="0"/>
               <a:pPr/>
-              <a:t>2017/9/4</a:t>
+              <a:t>2017/9/5</a:t>
             </a:fld>
             <a:endParaRPr kumimoji="1" lang="ja-JP" altLang="en-US"/>
           </a:p>
@@ -1412,7 +1412,7 @@
     </p:spTree>
     <p:extLst>
       <p:ext uri="{BB962C8B-B14F-4D97-AF65-F5344CB8AC3E}">
-        <p14:creationId xmlns:p14="http://schemas.microsoft.com/office/powerpoint/2010/main" xmlns="" val="168329274"/>
+        <p14:creationId xmlns="" xmlns:p14="http://schemas.microsoft.com/office/powerpoint/2010/main" val="168329274"/>
       </p:ext>
     </p:extLst>
   </p:cSld>
@@ -1784,7 +1784,7 @@
             <a:fld id="{D15E2E9D-520B-4AF5-9F19-1A682015C815}" type="datetimeFigureOut">
               <a:rPr kumimoji="1" lang="ja-JP" altLang="en-US" smtClean="0"/>
               <a:pPr/>
-              <a:t>2017/9/4</a:t>
+              <a:t>2017/9/5</a:t>
             </a:fld>
             <a:endParaRPr kumimoji="1" lang="ja-JP" altLang="en-US"/>
           </a:p>
@@ -1836,7 +1836,7 @@
     </p:spTree>
     <p:extLst>
       <p:ext uri="{BB962C8B-B14F-4D97-AF65-F5344CB8AC3E}">
-        <p14:creationId xmlns:p14="http://schemas.microsoft.com/office/powerpoint/2010/main" xmlns="" val="2326374058"/>
+        <p14:creationId xmlns="" xmlns:p14="http://schemas.microsoft.com/office/powerpoint/2010/main" val="2326374058"/>
       </p:ext>
     </p:extLst>
   </p:cSld>
@@ -1904,7 +1904,7 @@
             <a:fld id="{D15E2E9D-520B-4AF5-9F19-1A682015C815}" type="datetimeFigureOut">
               <a:rPr kumimoji="1" lang="ja-JP" altLang="en-US" smtClean="0"/>
               <a:pPr/>
-              <a:t>2017/9/4</a:t>
+              <a:t>2017/9/5</a:t>
             </a:fld>
             <a:endParaRPr kumimoji="1" lang="ja-JP" altLang="en-US"/>
           </a:p>
@@ -1956,7 +1956,7 @@
     </p:spTree>
     <p:extLst>
       <p:ext uri="{BB962C8B-B14F-4D97-AF65-F5344CB8AC3E}">
-        <p14:creationId xmlns:p14="http://schemas.microsoft.com/office/powerpoint/2010/main" xmlns="" val="1601968382"/>
+        <p14:creationId xmlns="" xmlns:p14="http://schemas.microsoft.com/office/powerpoint/2010/main" val="1601968382"/>
       </p:ext>
     </p:extLst>
   </p:cSld>
@@ -2001,7 +2001,7 @@
             <a:fld id="{D15E2E9D-520B-4AF5-9F19-1A682015C815}" type="datetimeFigureOut">
               <a:rPr kumimoji="1" lang="ja-JP" altLang="en-US" smtClean="0"/>
               <a:pPr/>
-              <a:t>2017/9/4</a:t>
+              <a:t>2017/9/5</a:t>
             </a:fld>
             <a:endParaRPr kumimoji="1" lang="ja-JP" altLang="en-US"/>
           </a:p>
@@ -2053,7 +2053,7 @@
     </p:spTree>
     <p:extLst>
       <p:ext uri="{BB962C8B-B14F-4D97-AF65-F5344CB8AC3E}">
-        <p14:creationId xmlns:p14="http://schemas.microsoft.com/office/powerpoint/2010/main" xmlns="" val="853932804"/>
+        <p14:creationId xmlns="" xmlns:p14="http://schemas.microsoft.com/office/powerpoint/2010/main" val="853932804"/>
       </p:ext>
     </p:extLst>
   </p:cSld>
@@ -2280,7 +2280,7 @@
             <a:fld id="{D15E2E9D-520B-4AF5-9F19-1A682015C815}" type="datetimeFigureOut">
               <a:rPr kumimoji="1" lang="ja-JP" altLang="en-US" smtClean="0"/>
               <a:pPr/>
-              <a:t>2017/9/4</a:t>
+              <a:t>2017/9/5</a:t>
             </a:fld>
             <a:endParaRPr kumimoji="1" lang="ja-JP" altLang="en-US"/>
           </a:p>
@@ -2332,7 +2332,7 @@
     </p:spTree>
     <p:extLst>
       <p:ext uri="{BB962C8B-B14F-4D97-AF65-F5344CB8AC3E}">
-        <p14:creationId xmlns:p14="http://schemas.microsoft.com/office/powerpoint/2010/main" xmlns="" val="4048580332"/>
+        <p14:creationId xmlns="" xmlns:p14="http://schemas.microsoft.com/office/powerpoint/2010/main" val="4048580332"/>
       </p:ext>
     </p:extLst>
   </p:cSld>
@@ -2535,7 +2535,7 @@
             <a:fld id="{D15E2E9D-520B-4AF5-9F19-1A682015C815}" type="datetimeFigureOut">
               <a:rPr kumimoji="1" lang="ja-JP" altLang="en-US" smtClean="0"/>
               <a:pPr/>
-              <a:t>2017/9/4</a:t>
+              <a:t>2017/9/5</a:t>
             </a:fld>
             <a:endParaRPr kumimoji="1" lang="ja-JP" altLang="en-US"/>
           </a:p>
@@ -2587,7 +2587,7 @@
     </p:spTree>
     <p:extLst>
       <p:ext uri="{BB962C8B-B14F-4D97-AF65-F5344CB8AC3E}">
-        <p14:creationId xmlns:p14="http://schemas.microsoft.com/office/powerpoint/2010/main" xmlns="" val="1178089545"/>
+        <p14:creationId xmlns="" xmlns:p14="http://schemas.microsoft.com/office/powerpoint/2010/main" val="1178089545"/>
       </p:ext>
     </p:extLst>
   </p:cSld>
@@ -2750,7 +2750,7 @@
             <a:fld id="{D15E2E9D-520B-4AF5-9F19-1A682015C815}" type="datetimeFigureOut">
               <a:rPr kumimoji="1" lang="ja-JP" altLang="en-US" smtClean="0"/>
               <a:pPr/>
-              <a:t>2017/9/4</a:t>
+              <a:t>2017/9/5</a:t>
             </a:fld>
             <a:endParaRPr kumimoji="1" lang="ja-JP" altLang="en-US"/>
           </a:p>
@@ -2838,7 +2838,7 @@
     </p:spTree>
     <p:extLst>
       <p:ext uri="{BB962C8B-B14F-4D97-AF65-F5344CB8AC3E}">
-        <p14:creationId xmlns:p14="http://schemas.microsoft.com/office/powerpoint/2010/main" xmlns="" val="1844975819"/>
+        <p14:creationId xmlns="" xmlns:p14="http://schemas.microsoft.com/office/powerpoint/2010/main" val="1844975819"/>
       </p:ext>
     </p:extLst>
   </p:cSld>
@@ -3139,7 +3139,7 @@
           <a:blip r:embed="rId2" cstate="print">
             <a:extLst>
               <a:ext uri="{28A0092B-C50C-407E-A947-70E740481C1C}">
-                <a14:useLocalDpi xmlns:a14="http://schemas.microsoft.com/office/drawing/2010/main" xmlns="" val="0"/>
+                <a14:useLocalDpi xmlns="" xmlns:a14="http://schemas.microsoft.com/office/drawing/2010/main" val="0"/>
               </a:ext>
             </a:extLst>
           </a:blip>
@@ -3169,7 +3169,7 @@
           <a:blip r:embed="rId3" cstate="print">
             <a:extLst>
               <a:ext uri="{28A0092B-C50C-407E-A947-70E740481C1C}">
-                <a14:useLocalDpi xmlns:a14="http://schemas.microsoft.com/office/drawing/2010/main" xmlns="" val="0"/>
+                <a14:useLocalDpi xmlns="" xmlns:a14="http://schemas.microsoft.com/office/drawing/2010/main" val="0"/>
               </a:ext>
             </a:extLst>
           </a:blip>
@@ -3364,7 +3364,7 @@
           <a:blip r:embed="rId4" cstate="print">
             <a:extLst>
               <a:ext uri="{28A0092B-C50C-407E-A947-70E740481C1C}">
-                <a14:useLocalDpi xmlns:a14="http://schemas.microsoft.com/office/drawing/2010/main" xmlns="" val="0"/>
+                <a14:useLocalDpi xmlns="" xmlns:a14="http://schemas.microsoft.com/office/drawing/2010/main" val="0"/>
               </a:ext>
             </a:extLst>
           </a:blip>
@@ -3384,7 +3384,7 @@
           <a:noFill/>
           <a:extLst>
             <a:ext uri="{909E8E84-426E-40DD-AFC4-6F175D3DCCD1}">
-              <a14:hiddenFill xmlns:a14="http://schemas.microsoft.com/office/drawing/2010/main" xmlns="">
+              <a14:hiddenFill xmlns="" xmlns:a14="http://schemas.microsoft.com/office/drawing/2010/main">
                 <a:solidFill>
                   <a:srgbClr val="FFFFFF"/>
                 </a:solidFill>
@@ -3396,7 +3396,7 @@
     </p:spTree>
     <p:extLst>
       <p:ext uri="{BB962C8B-B14F-4D97-AF65-F5344CB8AC3E}">
-        <p14:creationId xmlns:p14="http://schemas.microsoft.com/office/powerpoint/2010/main" xmlns="" val="1546032128"/>
+        <p14:creationId xmlns="" xmlns:p14="http://schemas.microsoft.com/office/powerpoint/2010/main" val="1546032128"/>
       </p:ext>
     </p:extLst>
   </p:cSld>
@@ -3492,7 +3492,7 @@
           <a:blip r:embed="rId2" cstate="print">
             <a:extLst>
               <a:ext uri="{28A0092B-C50C-407E-A947-70E740481C1C}">
-                <a14:useLocalDpi xmlns:a14="http://schemas.microsoft.com/office/drawing/2010/main" xmlns="" val="0"/>
+                <a14:useLocalDpi xmlns="" xmlns:a14="http://schemas.microsoft.com/office/drawing/2010/main" val="0"/>
               </a:ext>
             </a:extLst>
           </a:blip>
@@ -3683,7 +3683,7 @@
           <a:blip r:embed="rId3" cstate="print">
             <a:extLst>
               <a:ext uri="{28A0092B-C50C-407E-A947-70E740481C1C}">
-                <a14:useLocalDpi xmlns:a14="http://schemas.microsoft.com/office/drawing/2010/main" xmlns="" val="0"/>
+                <a14:useLocalDpi xmlns="" xmlns:a14="http://schemas.microsoft.com/office/drawing/2010/main" val="0"/>
               </a:ext>
             </a:extLst>
           </a:blip>
@@ -3703,7 +3703,7 @@
           <a:noFill/>
           <a:extLst>
             <a:ext uri="{909E8E84-426E-40DD-AFC4-6F175D3DCCD1}">
-              <a14:hiddenFill xmlns:a14="http://schemas.microsoft.com/office/drawing/2010/main" xmlns="">
+              <a14:hiddenFill xmlns="" xmlns:a14="http://schemas.microsoft.com/office/drawing/2010/main">
                 <a:solidFill>
                   <a:srgbClr val="FFFFFF"/>
                 </a:solidFill>
@@ -3724,7 +3724,7 @@
           <a:blip r:embed="rId4" cstate="print">
             <a:extLst>
               <a:ext uri="{28A0092B-C50C-407E-A947-70E740481C1C}">
-                <a14:useLocalDpi xmlns:a14="http://schemas.microsoft.com/office/drawing/2010/main" xmlns="" val="0"/>
+                <a14:useLocalDpi xmlns="" xmlns:a14="http://schemas.microsoft.com/office/drawing/2010/main" val="0"/>
               </a:ext>
             </a:extLst>
           </a:blip>
@@ -3745,14 +3745,14 @@
           </a:ln>
           <a:extLst>
             <a:ext uri="{909E8E84-426E-40DD-AFC4-6F175D3DCCD1}">
-              <a14:hiddenFill xmlns:a14="http://schemas.microsoft.com/office/drawing/2010/main" xmlns="">
+              <a14:hiddenFill xmlns="" xmlns:a14="http://schemas.microsoft.com/office/drawing/2010/main">
                 <a:solidFill>
                   <a:schemeClr val="accent1"/>
                 </a:solidFill>
               </a14:hiddenFill>
             </a:ext>
             <a:ext uri="{91240B29-F687-4F45-9708-019B960494DF}">
-              <a14:hiddenLine xmlns:a14="http://schemas.microsoft.com/office/drawing/2010/main" xmlns="" w="9525">
+              <a14:hiddenLine xmlns="" xmlns:a14="http://schemas.microsoft.com/office/drawing/2010/main" w="9525">
                 <a:solidFill>
                   <a:schemeClr val="tx1"/>
                 </a:solidFill>
@@ -3776,7 +3776,7 @@
           <a:blip r:embed="rId5" cstate="print">
             <a:extLst>
               <a:ext uri="{28A0092B-C50C-407E-A947-70E740481C1C}">
-                <a14:useLocalDpi xmlns:a14="http://schemas.microsoft.com/office/drawing/2010/main" xmlns="" val="0"/>
+                <a14:useLocalDpi xmlns="" xmlns:a14="http://schemas.microsoft.com/office/drawing/2010/main" val="0"/>
               </a:ext>
             </a:extLst>
           </a:blip>
@@ -3796,7 +3796,7 @@
           <a:noFill/>
           <a:extLst>
             <a:ext uri="{909E8E84-426E-40DD-AFC4-6F175D3DCCD1}">
-              <a14:hiddenFill xmlns:a14="http://schemas.microsoft.com/office/drawing/2010/main" xmlns="">
+              <a14:hiddenFill xmlns="" xmlns:a14="http://schemas.microsoft.com/office/drawing/2010/main">
                 <a:solidFill>
                   <a:srgbClr val="FFFFFF"/>
                 </a:solidFill>
@@ -3808,7 +3808,7 @@
     </p:spTree>
     <p:extLst>
       <p:ext uri="{BB962C8B-B14F-4D97-AF65-F5344CB8AC3E}">
-        <p14:creationId xmlns:p14="http://schemas.microsoft.com/office/powerpoint/2010/main" xmlns="" val="1546032128"/>
+        <p14:creationId xmlns="" xmlns:p14="http://schemas.microsoft.com/office/powerpoint/2010/main" val="1546032128"/>
       </p:ext>
     </p:extLst>
   </p:cSld>
@@ -3854,7 +3854,7 @@
           <a:blip r:embed="rId2" cstate="print">
             <a:extLst>
               <a:ext uri="{28A0092B-C50C-407E-A947-70E740481C1C}">
-                <a14:useLocalDpi xmlns:a14="http://schemas.microsoft.com/office/drawing/2010/main" xmlns="" val="0"/>
+                <a14:useLocalDpi xmlns="" xmlns:a14="http://schemas.microsoft.com/office/drawing/2010/main" val="0"/>
               </a:ext>
             </a:extLst>
           </a:blip>
@@ -3884,7 +3884,7 @@
           <a:blip r:embed="rId3" cstate="print">
             <a:extLst>
               <a:ext uri="{28A0092B-C50C-407E-A947-70E740481C1C}">
-                <a14:useLocalDpi xmlns:a14="http://schemas.microsoft.com/office/drawing/2010/main" xmlns="" val="0"/>
+                <a14:useLocalDpi xmlns="" xmlns:a14="http://schemas.microsoft.com/office/drawing/2010/main" val="0"/>
               </a:ext>
             </a:extLst>
           </a:blip>
@@ -4075,7 +4075,7 @@
           <a:blip r:embed="rId4" cstate="print">
             <a:extLst>
               <a:ext uri="{28A0092B-C50C-407E-A947-70E740481C1C}">
-                <a14:useLocalDpi xmlns:a14="http://schemas.microsoft.com/office/drawing/2010/main" xmlns="" val="0"/>
+                <a14:useLocalDpi xmlns="" xmlns:a14="http://schemas.microsoft.com/office/drawing/2010/main" val="0"/>
               </a:ext>
             </a:extLst>
           </a:blip>
@@ -4095,7 +4095,7 @@
           <a:noFill/>
           <a:extLst>
             <a:ext uri="{909E8E84-426E-40DD-AFC4-6F175D3DCCD1}">
-              <a14:hiddenFill xmlns:a14="http://schemas.microsoft.com/office/drawing/2010/main" xmlns="">
+              <a14:hiddenFill xmlns="" xmlns:a14="http://schemas.microsoft.com/office/drawing/2010/main">
                 <a:solidFill>
                   <a:srgbClr val="FFFFFF"/>
                 </a:solidFill>
@@ -4149,7 +4149,7 @@
           <a:blip r:embed="rId3" cstate="print">
             <a:extLst>
               <a:ext uri="{28A0092B-C50C-407E-A947-70E740481C1C}">
-                <a14:useLocalDpi xmlns:a14="http://schemas.microsoft.com/office/drawing/2010/main" xmlns="" val="0"/>
+                <a14:useLocalDpi xmlns="" xmlns:a14="http://schemas.microsoft.com/office/drawing/2010/main" val="0"/>
               </a:ext>
             </a:extLst>
           </a:blip>
@@ -4212,7 +4212,7 @@
     </p:spTree>
     <p:extLst>
       <p:ext uri="{BB962C8B-B14F-4D97-AF65-F5344CB8AC3E}">
-        <p14:creationId xmlns:p14="http://schemas.microsoft.com/office/powerpoint/2010/main" xmlns="" val="1546032128"/>
+        <p14:creationId xmlns="" xmlns:p14="http://schemas.microsoft.com/office/powerpoint/2010/main" val="1546032128"/>
       </p:ext>
     </p:extLst>
   </p:cSld>
@@ -4258,7 +4258,7 @@
           <a:blip r:embed="rId2" cstate="print">
             <a:extLst>
               <a:ext uri="{28A0092B-C50C-407E-A947-70E740481C1C}">
-                <a14:useLocalDpi xmlns:a14="http://schemas.microsoft.com/office/drawing/2010/main" xmlns="" val="0"/>
+                <a14:useLocalDpi xmlns="" xmlns:a14="http://schemas.microsoft.com/office/drawing/2010/main" val="0"/>
               </a:ext>
             </a:extLst>
           </a:blip>
@@ -4374,7 +4374,7 @@
           <a:blip r:embed="rId3" cstate="print">
             <a:extLst>
               <a:ext uri="{28A0092B-C50C-407E-A947-70E740481C1C}">
-                <a14:useLocalDpi xmlns:a14="http://schemas.microsoft.com/office/drawing/2010/main" xmlns="" val="0"/>
+                <a14:useLocalDpi xmlns="" xmlns:a14="http://schemas.microsoft.com/office/drawing/2010/main" val="0"/>
               </a:ext>
             </a:extLst>
           </a:blip>
@@ -4394,7 +4394,7 @@
           <a:noFill/>
           <a:extLst>
             <a:ext uri="{909E8E84-426E-40DD-AFC4-6F175D3DCCD1}">
-              <a14:hiddenFill xmlns:a14="http://schemas.microsoft.com/office/drawing/2010/main" xmlns="">
+              <a14:hiddenFill xmlns="" xmlns:a14="http://schemas.microsoft.com/office/drawing/2010/main">
                 <a:solidFill>
                   <a:srgbClr val="FFFFFF"/>
                 </a:solidFill>
@@ -4448,7 +4448,7 @@
           <a:blip r:embed="rId4" cstate="print">
             <a:extLst>
               <a:ext uri="{28A0092B-C50C-407E-A947-70E740481C1C}">
-                <a14:useLocalDpi xmlns:a14="http://schemas.microsoft.com/office/drawing/2010/main" xmlns="" val="0"/>
+                <a14:useLocalDpi xmlns="" xmlns:a14="http://schemas.microsoft.com/office/drawing/2010/main" val="0"/>
               </a:ext>
             </a:extLst>
           </a:blip>
@@ -4508,7 +4508,7 @@
           <a:blip r:embed="rId5" cstate="print">
             <a:extLst>
               <a:ext uri="{28A0092B-C50C-407E-A947-70E740481C1C}">
-                <a14:useLocalDpi xmlns:a14="http://schemas.microsoft.com/office/drawing/2010/main" xmlns="" val="0"/>
+                <a14:useLocalDpi xmlns="" xmlns:a14="http://schemas.microsoft.com/office/drawing/2010/main" val="0"/>
               </a:ext>
             </a:extLst>
           </a:blip>
@@ -4604,7 +4604,7 @@
     </p:spTree>
     <p:extLst>
       <p:ext uri="{BB962C8B-B14F-4D97-AF65-F5344CB8AC3E}">
-        <p14:creationId xmlns:p14="http://schemas.microsoft.com/office/powerpoint/2010/main" xmlns="" val="1546032128"/>
+        <p14:creationId xmlns="" xmlns:p14="http://schemas.microsoft.com/office/powerpoint/2010/main" val="1546032128"/>
       </p:ext>
     </p:extLst>
   </p:cSld>
@@ -4745,7 +4745,7 @@
           <a:blip r:embed="rId2" cstate="print">
             <a:extLst>
               <a:ext uri="{28A0092B-C50C-407E-A947-70E740481C1C}">
-                <a14:useLocalDpi xmlns:a14="http://schemas.microsoft.com/office/drawing/2010/main" xmlns="" val="0"/>
+                <a14:useLocalDpi xmlns="" xmlns:a14="http://schemas.microsoft.com/office/drawing/2010/main" val="0"/>
               </a:ext>
             </a:extLst>
           </a:blip>
@@ -4861,7 +4861,7 @@
           <a:blip r:embed="rId3" cstate="print">
             <a:extLst>
               <a:ext uri="{28A0092B-C50C-407E-A947-70E740481C1C}">
-                <a14:useLocalDpi xmlns:a14="http://schemas.microsoft.com/office/drawing/2010/main" xmlns="" val="0"/>
+                <a14:useLocalDpi xmlns="" xmlns:a14="http://schemas.microsoft.com/office/drawing/2010/main" val="0"/>
               </a:ext>
             </a:extLst>
           </a:blip>
@@ -4881,7 +4881,7 @@
           <a:noFill/>
           <a:extLst>
             <a:ext uri="{909E8E84-426E-40DD-AFC4-6F175D3DCCD1}">
-              <a14:hiddenFill xmlns:a14="http://schemas.microsoft.com/office/drawing/2010/main" xmlns="">
+              <a14:hiddenFill xmlns="" xmlns:a14="http://schemas.microsoft.com/office/drawing/2010/main">
                 <a:solidFill>
                   <a:srgbClr val="FFFFFF"/>
                 </a:solidFill>
@@ -4985,7 +4985,7 @@
           <a:blip r:embed="rId2" cstate="print">
             <a:extLst>
               <a:ext uri="{28A0092B-C50C-407E-A947-70E740481C1C}">
-                <a14:useLocalDpi xmlns:a14="http://schemas.microsoft.com/office/drawing/2010/main" xmlns="" val="0"/>
+                <a14:useLocalDpi xmlns="" xmlns:a14="http://schemas.microsoft.com/office/drawing/2010/main" val="0"/>
               </a:ext>
             </a:extLst>
           </a:blip>
@@ -5046,7 +5046,7 @@
           <a:blip r:embed="rId4" cstate="print">
             <a:extLst>
               <a:ext uri="{28A0092B-C50C-407E-A947-70E740481C1C}">
-                <a14:useLocalDpi xmlns:a14="http://schemas.microsoft.com/office/drawing/2010/main" xmlns="" val="0"/>
+                <a14:useLocalDpi xmlns="" xmlns:a14="http://schemas.microsoft.com/office/drawing/2010/main" val="0"/>
               </a:ext>
             </a:extLst>
           </a:blip>
@@ -5109,7 +5109,7 @@
     </p:spTree>
     <p:extLst>
       <p:ext uri="{BB962C8B-B14F-4D97-AF65-F5344CB8AC3E}">
-        <p14:creationId xmlns:p14="http://schemas.microsoft.com/office/powerpoint/2010/main" xmlns="" val="1546032128"/>
+        <p14:creationId xmlns="" xmlns:p14="http://schemas.microsoft.com/office/powerpoint/2010/main" val="1546032128"/>
       </p:ext>
     </p:extLst>
   </p:cSld>
@@ -5250,7 +5250,7 @@
           <a:blip r:embed="rId2" cstate="print">
             <a:extLst>
               <a:ext uri="{28A0092B-C50C-407E-A947-70E740481C1C}">
-                <a14:useLocalDpi xmlns:a14="http://schemas.microsoft.com/office/drawing/2010/main" xmlns="" val="0"/>
+                <a14:useLocalDpi xmlns="" xmlns:a14="http://schemas.microsoft.com/office/drawing/2010/main" val="0"/>
               </a:ext>
             </a:extLst>
           </a:blip>
@@ -5366,7 +5366,7 @@
           <a:blip r:embed="rId3" cstate="print">
             <a:extLst>
               <a:ext uri="{28A0092B-C50C-407E-A947-70E740481C1C}">
-                <a14:useLocalDpi xmlns:a14="http://schemas.microsoft.com/office/drawing/2010/main" xmlns="" val="0"/>
+                <a14:useLocalDpi xmlns="" xmlns:a14="http://schemas.microsoft.com/office/drawing/2010/main" val="0"/>
               </a:ext>
             </a:extLst>
           </a:blip>
@@ -5386,7 +5386,7 @@
           <a:noFill/>
           <a:extLst>
             <a:ext uri="{909E8E84-426E-40DD-AFC4-6F175D3DCCD1}">
-              <a14:hiddenFill xmlns:a14="http://schemas.microsoft.com/office/drawing/2010/main" xmlns="">
+              <a14:hiddenFill xmlns="" xmlns:a14="http://schemas.microsoft.com/office/drawing/2010/main">
                 <a:solidFill>
                   <a:srgbClr val="FFFFFF"/>
                 </a:solidFill>
@@ -5440,7 +5440,7 @@
           <a:blip r:embed="rId4" cstate="print">
             <a:extLst>
               <a:ext uri="{28A0092B-C50C-407E-A947-70E740481C1C}">
-                <a14:useLocalDpi xmlns:a14="http://schemas.microsoft.com/office/drawing/2010/main" xmlns="" val="0"/>
+                <a14:useLocalDpi xmlns="" xmlns:a14="http://schemas.microsoft.com/office/drawing/2010/main" val="0"/>
               </a:ext>
             </a:extLst>
           </a:blip>
@@ -5550,7 +5550,7 @@
           <a:blip r:embed="rId2" cstate="print">
             <a:extLst>
               <a:ext uri="{28A0092B-C50C-407E-A947-70E740481C1C}">
-                <a14:useLocalDpi xmlns:a14="http://schemas.microsoft.com/office/drawing/2010/main" xmlns="" val="0"/>
+                <a14:useLocalDpi xmlns="" xmlns:a14="http://schemas.microsoft.com/office/drawing/2010/main" val="0"/>
               </a:ext>
             </a:extLst>
           </a:blip>
@@ -5592,11 +5592,7 @@
           <a:p>
             <a:r>
               <a:rPr lang="en-US" altLang="ja-JP" dirty="0" smtClean="0"/>
-              <a:t>A</a:t>
-            </a:r>
-            <a:r>
-              <a:rPr lang="en-US" altLang="ja-JP" dirty="0" smtClean="0"/>
-              <a:t>gent</a:t>
+              <a:t>Agent</a:t>
             </a:r>
             <a:endParaRPr kumimoji="1" lang="ja-JP" altLang="en-US" dirty="0"/>
           </a:p>
@@ -5614,7 +5610,7 @@
           <a:blip r:embed="rId5" cstate="print">
             <a:extLst>
               <a:ext uri="{28A0092B-C50C-407E-A947-70E740481C1C}">
-                <a14:useLocalDpi xmlns:a14="http://schemas.microsoft.com/office/drawing/2010/main" xmlns="" val="0"/>
+                <a14:useLocalDpi xmlns="" xmlns:a14="http://schemas.microsoft.com/office/drawing/2010/main" val="0"/>
               </a:ext>
             </a:extLst>
           </a:blip>
@@ -5706,7 +5702,7 @@
     </p:spTree>
     <p:extLst>
       <p:ext uri="{BB962C8B-B14F-4D97-AF65-F5344CB8AC3E}">
-        <p14:creationId xmlns:p14="http://schemas.microsoft.com/office/powerpoint/2010/main" xmlns="" val="1546032128"/>
+        <p14:creationId xmlns="" xmlns:p14="http://schemas.microsoft.com/office/powerpoint/2010/main" val="1546032128"/>
       </p:ext>
     </p:extLst>
   </p:cSld>
@@ -5748,8 +5744,8 @@
         </p:nvSpPr>
         <p:spPr>
           <a:xfrm>
-            <a:off x="683568" y="2405641"/>
-            <a:ext cx="4514372" cy="3015044"/>
+            <a:off x="993732" y="2405641"/>
+            <a:ext cx="4370356" cy="3015044"/>
           </a:xfrm>
           <a:prstGeom prst="roundRect">
             <a:avLst/>
@@ -5792,14 +5788,14 @@
       </p:sp>
       <p:sp>
         <p:nvSpPr>
-          <p:cNvPr id="30" name="テキスト ボックス 29"/>
+          <p:cNvPr id="12" name="テキスト ボックス 11"/>
           <p:cNvSpPr txBox="1"/>
           <p:nvPr/>
         </p:nvSpPr>
         <p:spPr>
           <a:xfrm>
-            <a:off x="979779" y="2036309"/>
-            <a:ext cx="925703" cy="369332"/>
+            <a:off x="3607914" y="4585412"/>
+            <a:ext cx="1105880" cy="369332"/>
           </a:xfrm>
           <a:prstGeom prst="rect">
             <a:avLst/>
@@ -5813,77 +5809,6 @@
           <a:lstStyle/>
           <a:p>
             <a:r>
-              <a:rPr kumimoji="1" lang="en-US" altLang="ja-JP" dirty="0" smtClean="0"/>
-              <a:t>Factory</a:t>
-            </a:r>
-            <a:endParaRPr kumimoji="1" lang="ja-JP" altLang="en-US" dirty="0"/>
-          </a:p>
-        </p:txBody>
-      </p:sp>
-      <p:pic>
-        <p:nvPicPr>
-          <p:cNvPr id="1026" name="Picture 2" descr="C:\Users\knimura\AppData\Local\Microsoft\Windows\Temporary Internet Files\Content.IE5\OV1HUXRW\Factory_icon.svg[1].png"/>
-          <p:cNvPicPr>
-            <a:picLocks noChangeAspect="1" noChangeArrowheads="1"/>
-          </p:cNvPicPr>
-          <p:nvPr/>
-        </p:nvPicPr>
-        <p:blipFill>
-          <a:blip r:embed="rId2" cstate="print">
-            <a:extLst>
-              <a:ext uri="{28A0092B-C50C-407E-A947-70E740481C1C}">
-                <a14:useLocalDpi xmlns:a14="http://schemas.microsoft.com/office/drawing/2010/main" xmlns="" val="0"/>
-              </a:ext>
-            </a:extLst>
-          </a:blip>
-          <a:srcRect/>
-          <a:stretch>
-            <a:fillRect/>
-          </a:stretch>
-        </p:blipFill>
-        <p:spPr bwMode="auto">
-          <a:xfrm>
-            <a:off x="700613" y="2113083"/>
-            <a:ext cx="1008112" cy="939314"/>
-          </a:xfrm>
-          <a:prstGeom prst="rect">
-            <a:avLst/>
-          </a:prstGeom>
-          <a:noFill/>
-          <a:extLst>
-            <a:ext uri="{909E8E84-426E-40DD-AFC4-6F175D3DCCD1}">
-              <a14:hiddenFill xmlns:a14="http://schemas.microsoft.com/office/drawing/2010/main" xmlns="">
-                <a:solidFill>
-                  <a:srgbClr val="FFFFFF"/>
-                </a:solidFill>
-              </a14:hiddenFill>
-            </a:ext>
-          </a:extLst>
-        </p:spPr>
-      </p:pic>
-      <p:sp>
-        <p:nvSpPr>
-          <p:cNvPr id="12" name="テキスト ボックス 11"/>
-          <p:cNvSpPr txBox="1"/>
-          <p:nvPr/>
-        </p:nvSpPr>
-        <p:spPr>
-          <a:xfrm>
-            <a:off x="3607914" y="4585412"/>
-            <a:ext cx="1105880" cy="369332"/>
-          </a:xfrm>
-          <a:prstGeom prst="rect">
-            <a:avLst/>
-          </a:prstGeom>
-          <a:noFill/>
-        </p:spPr>
-        <p:txBody>
-          <a:bodyPr wrap="none" rtlCol="0">
-            <a:spAutoFit/>
-          </a:bodyPr>
-          <a:lstStyle/>
-          <a:p>
-            <a:r>
               <a:rPr kumimoji="1" lang="en-US" altLang="ja-JP" dirty="0" err="1" smtClean="0"/>
               <a:t>EtherCAT</a:t>
             </a:r>
@@ -5891,47 +5816,6 @@
           </a:p>
         </p:txBody>
       </p:sp>
-      <p:pic>
-        <p:nvPicPr>
-          <p:cNvPr id="1028" name="Picture 4" descr="C:\Users\knimura\AppData\Local\Microsoft\Windows\Temporary Internet Files\Content.IE5\8TTJABOM\Nuvola_filesystems_server[1].png"/>
-          <p:cNvPicPr>
-            <a:picLocks noChangeAspect="1" noChangeArrowheads="1"/>
-          </p:cNvPicPr>
-          <p:nvPr/>
-        </p:nvPicPr>
-        <p:blipFill>
-          <a:blip r:embed="rId3" cstate="print">
-            <a:extLst>
-              <a:ext uri="{28A0092B-C50C-407E-A947-70E740481C1C}">
-                <a14:useLocalDpi xmlns:a14="http://schemas.microsoft.com/office/drawing/2010/main" xmlns="" val="0"/>
-              </a:ext>
-            </a:extLst>
-          </a:blip>
-          <a:srcRect/>
-          <a:stretch>
-            <a:fillRect/>
-          </a:stretch>
-        </p:blipFill>
-        <p:spPr bwMode="auto">
-          <a:xfrm>
-            <a:off x="2467785" y="4385760"/>
-            <a:ext cx="609600" cy="609600"/>
-          </a:xfrm>
-          <a:prstGeom prst="rect">
-            <a:avLst/>
-          </a:prstGeom>
-          <a:noFill/>
-          <a:extLst>
-            <a:ext uri="{909E8E84-426E-40DD-AFC4-6F175D3DCCD1}">
-              <a14:hiddenFill xmlns:a14="http://schemas.microsoft.com/office/drawing/2010/main" xmlns="">
-                <a:solidFill>
-                  <a:srgbClr val="FFFFFF"/>
-                </a:solidFill>
-              </a14:hiddenFill>
-            </a:ext>
-          </a:extLst>
-        </p:spPr>
-      </p:pic>
       <p:sp>
         <p:nvSpPr>
           <p:cNvPr id="18" name="正方形/長方形 17"/>
@@ -5984,47 +5868,6 @@
           </a:p>
         </p:txBody>
       </p:sp>
-      <p:pic>
-        <p:nvPicPr>
-          <p:cNvPr id="38" name="Picture 4" descr="C:\Users\knimura\AppData\Local\Microsoft\Windows\Temporary Internet Files\Content.IE5\8TTJABOM\Nuvola_filesystems_server[1].png"/>
-          <p:cNvPicPr>
-            <a:picLocks noChangeAspect="1" noChangeArrowheads="1"/>
-          </p:cNvPicPr>
-          <p:nvPr/>
-        </p:nvPicPr>
-        <p:blipFill>
-          <a:blip r:embed="rId3" cstate="print">
-            <a:extLst>
-              <a:ext uri="{28A0092B-C50C-407E-A947-70E740481C1C}">
-                <a14:useLocalDpi xmlns:a14="http://schemas.microsoft.com/office/drawing/2010/main" xmlns="" val="0"/>
-              </a:ext>
-            </a:extLst>
-          </a:blip>
-          <a:srcRect/>
-          <a:stretch>
-            <a:fillRect/>
-          </a:stretch>
-        </p:blipFill>
-        <p:spPr bwMode="auto">
-          <a:xfrm>
-            <a:off x="3217342" y="4386624"/>
-            <a:ext cx="609600" cy="609600"/>
-          </a:xfrm>
-          <a:prstGeom prst="rect">
-            <a:avLst/>
-          </a:prstGeom>
-          <a:noFill/>
-          <a:extLst>
-            <a:ext uri="{909E8E84-426E-40DD-AFC4-6F175D3DCCD1}">
-              <a14:hiddenFill xmlns:a14="http://schemas.microsoft.com/office/drawing/2010/main" xmlns="">
-                <a:solidFill>
-                  <a:srgbClr val="FFFFFF"/>
-                </a:solidFill>
-              </a14:hiddenFill>
-            </a:ext>
-          </a:extLst>
-        </p:spPr>
-      </p:pic>
       <p:sp>
         <p:nvSpPr>
           <p:cNvPr id="39" name="正方形/長方形 38"/>
@@ -6086,10 +5929,10 @@
           <p:nvPr/>
         </p:nvPicPr>
         <p:blipFill>
-          <a:blip r:embed="rId4" cstate="print">
+          <a:blip r:embed="rId2" cstate="print">
             <a:extLst>
               <a:ext uri="{28A0092B-C50C-407E-A947-70E740481C1C}">
-                <a14:useLocalDpi xmlns:a14="http://schemas.microsoft.com/office/drawing/2010/main" xmlns="" val="0"/>
+                <a14:useLocalDpi xmlns="" xmlns:a14="http://schemas.microsoft.com/office/drawing/2010/main" val="0"/>
               </a:ext>
             </a:extLst>
           </a:blip>
@@ -6109,7 +5952,7 @@
           <a:noFill/>
           <a:extLst>
             <a:ext uri="{909E8E84-426E-40DD-AFC4-6F175D3DCCD1}">
-              <a14:hiddenFill xmlns:a14="http://schemas.microsoft.com/office/drawing/2010/main" xmlns="">
+              <a14:hiddenFill xmlns="" xmlns:a14="http://schemas.microsoft.com/office/drawing/2010/main">
                 <a:solidFill>
                   <a:srgbClr val="FFFFFF"/>
                 </a:solidFill>
@@ -6127,10 +5970,10 @@
           <p:nvPr/>
         </p:nvPicPr>
         <p:blipFill>
-          <a:blip r:embed="rId4" cstate="print">
+          <a:blip r:embed="rId2" cstate="print">
             <a:extLst>
               <a:ext uri="{28A0092B-C50C-407E-A947-70E740481C1C}">
-                <a14:useLocalDpi xmlns:a14="http://schemas.microsoft.com/office/drawing/2010/main" xmlns="" val="0"/>
+                <a14:useLocalDpi xmlns="" xmlns:a14="http://schemas.microsoft.com/office/drawing/2010/main" val="0"/>
               </a:ext>
             </a:extLst>
           </a:blip>
@@ -6150,7 +5993,7 @@
           <a:noFill/>
           <a:extLst>
             <a:ext uri="{909E8E84-426E-40DD-AFC4-6F175D3DCCD1}">
-              <a14:hiddenFill xmlns:a14="http://schemas.microsoft.com/office/drawing/2010/main" xmlns="">
+              <a14:hiddenFill xmlns="" xmlns:a14="http://schemas.microsoft.com/office/drawing/2010/main">
                 <a:solidFill>
                   <a:srgbClr val="FFFFFF"/>
                 </a:solidFill>
@@ -6159,47 +6002,6 @@
           </a:extLst>
         </p:spPr>
       </p:pic>
-      <p:pic>
-        <p:nvPicPr>
-          <p:cNvPr id="52" name="Picture 4" descr="C:\Users\knimura\AppData\Local\Microsoft\Windows\Temporary Internet Files\Content.IE5\8TTJABOM\Nuvola_filesystems_server[1].png"/>
-          <p:cNvPicPr>
-            <a:picLocks noChangeAspect="1" noChangeArrowheads="1"/>
-          </p:cNvPicPr>
-          <p:nvPr/>
-        </p:nvPicPr>
-        <p:blipFill>
-          <a:blip r:embed="rId3" cstate="print">
-            <a:extLst>
-              <a:ext uri="{28A0092B-C50C-407E-A947-70E740481C1C}">
-                <a14:useLocalDpi xmlns:a14="http://schemas.microsoft.com/office/drawing/2010/main" xmlns="" val="0"/>
-              </a:ext>
-            </a:extLst>
-          </a:blip>
-          <a:srcRect/>
-          <a:stretch>
-            <a:fillRect/>
-          </a:stretch>
-        </p:blipFill>
-        <p:spPr bwMode="auto">
-          <a:xfrm>
-            <a:off x="2265551" y="3048136"/>
-            <a:ext cx="609600" cy="609600"/>
-          </a:xfrm>
-          <a:prstGeom prst="rect">
-            <a:avLst/>
-          </a:prstGeom>
-          <a:noFill/>
-          <a:extLst>
-            <a:ext uri="{909E8E84-426E-40DD-AFC4-6F175D3DCCD1}">
-              <a14:hiddenFill xmlns:a14="http://schemas.microsoft.com/office/drawing/2010/main" xmlns="">
-                <a:solidFill>
-                  <a:srgbClr val="FFFFFF"/>
-                </a:solidFill>
-              </a14:hiddenFill>
-            </a:ext>
-          </a:extLst>
-        </p:spPr>
-      </p:pic>
       <p:sp>
         <p:nvSpPr>
           <p:cNvPr id="53" name="正方形/長方形 52"/>
@@ -6208,7 +6010,7 @@
         </p:nvSpPr>
         <p:spPr>
           <a:xfrm>
-            <a:off x="2733200" y="3573696"/>
+            <a:off x="2699792" y="3573696"/>
             <a:ext cx="440003" cy="49966"/>
           </a:xfrm>
           <a:prstGeom prst="rect">
@@ -6252,47 +6054,6 @@
           </a:p>
         </p:txBody>
       </p:sp>
-      <p:pic>
-        <p:nvPicPr>
-          <p:cNvPr id="54" name="Picture 4" descr="C:\Users\knimura\AppData\Local\Microsoft\Windows\Temporary Internet Files\Content.IE5\8TTJABOM\Nuvola_filesystems_server[1].png"/>
-          <p:cNvPicPr>
-            <a:picLocks noChangeAspect="1" noChangeArrowheads="1"/>
-          </p:cNvPicPr>
-          <p:nvPr/>
-        </p:nvPicPr>
-        <p:blipFill>
-          <a:blip r:embed="rId3" cstate="print">
-            <a:extLst>
-              <a:ext uri="{28A0092B-C50C-407E-A947-70E740481C1C}">
-                <a14:useLocalDpi xmlns:a14="http://schemas.microsoft.com/office/drawing/2010/main" xmlns="" val="0"/>
-              </a:ext>
-            </a:extLst>
-          </a:blip>
-          <a:srcRect/>
-          <a:stretch>
-            <a:fillRect/>
-          </a:stretch>
-        </p:blipFill>
-        <p:spPr bwMode="auto">
-          <a:xfrm>
-            <a:off x="3015108" y="3049000"/>
-            <a:ext cx="609600" cy="609600"/>
-          </a:xfrm>
-          <a:prstGeom prst="rect">
-            <a:avLst/>
-          </a:prstGeom>
-          <a:noFill/>
-          <a:extLst>
-            <a:ext uri="{909E8E84-426E-40DD-AFC4-6F175D3DCCD1}">
-              <a14:hiddenFill xmlns:a14="http://schemas.microsoft.com/office/drawing/2010/main" xmlns="">
-                <a:solidFill>
-                  <a:srgbClr val="FFFFFF"/>
-                </a:solidFill>
-              </a14:hiddenFill>
-            </a:ext>
-          </a:extLst>
-        </p:spPr>
-      </p:pic>
       <p:sp>
         <p:nvSpPr>
           <p:cNvPr id="55" name="正方形/長方形 54"/>
@@ -6301,8 +6062,8 @@
         </p:nvSpPr>
         <p:spPr>
           <a:xfrm>
-            <a:off x="3482757" y="3574560"/>
-            <a:ext cx="755966" cy="49966"/>
+            <a:off x="3347864" y="3574560"/>
+            <a:ext cx="890859" cy="49966"/>
           </a:xfrm>
           <a:prstGeom prst="rect">
             <a:avLst/>
@@ -6354,10 +6115,10 @@
           <p:nvPr/>
         </p:nvPicPr>
         <p:blipFill>
-          <a:blip r:embed="rId4" cstate="print">
+          <a:blip r:embed="rId2" cstate="print">
             <a:extLst>
               <a:ext uri="{28A0092B-C50C-407E-A947-70E740481C1C}">
-                <a14:useLocalDpi xmlns:a14="http://schemas.microsoft.com/office/drawing/2010/main" xmlns="" val="0"/>
+                <a14:useLocalDpi xmlns="" xmlns:a14="http://schemas.microsoft.com/office/drawing/2010/main" val="0"/>
               </a:ext>
             </a:extLst>
           </a:blip>
@@ -6368,7 +6129,7 @@
         </p:blipFill>
         <p:spPr bwMode="auto">
           <a:xfrm>
-            <a:off x="2265522" y="2468013"/>
+            <a:off x="2195736" y="2468013"/>
             <a:ext cx="609629" cy="609629"/>
           </a:xfrm>
           <a:prstGeom prst="rect">
@@ -6377,7 +6138,7 @@
           <a:noFill/>
           <a:extLst>
             <a:ext uri="{909E8E84-426E-40DD-AFC4-6F175D3DCCD1}">
-              <a14:hiddenFill xmlns:a14="http://schemas.microsoft.com/office/drawing/2010/main" xmlns="">
+              <a14:hiddenFill xmlns="" xmlns:a14="http://schemas.microsoft.com/office/drawing/2010/main">
                 <a:solidFill>
                   <a:srgbClr val="FFFFFF"/>
                 </a:solidFill>
@@ -6395,10 +6156,10 @@
           <p:nvPr/>
         </p:nvPicPr>
         <p:blipFill>
-          <a:blip r:embed="rId4" cstate="print">
+          <a:blip r:embed="rId2" cstate="print">
             <a:extLst>
               <a:ext uri="{28A0092B-C50C-407E-A947-70E740481C1C}">
-                <a14:useLocalDpi xmlns:a14="http://schemas.microsoft.com/office/drawing/2010/main" xmlns="" val="0"/>
+                <a14:useLocalDpi xmlns="" xmlns:a14="http://schemas.microsoft.com/office/drawing/2010/main" val="0"/>
               </a:ext>
             </a:extLst>
           </a:blip>
@@ -6409,7 +6170,7 @@
         </p:blipFill>
         <p:spPr bwMode="auto">
           <a:xfrm>
-            <a:off x="3058664" y="2463478"/>
+            <a:off x="2949724" y="2463478"/>
             <a:ext cx="609629" cy="609629"/>
           </a:xfrm>
           <a:prstGeom prst="rect">
@@ -6418,7 +6179,7 @@
           <a:noFill/>
           <a:extLst>
             <a:ext uri="{909E8E84-426E-40DD-AFC4-6F175D3DCCD1}">
-              <a14:hiddenFill xmlns:a14="http://schemas.microsoft.com/office/drawing/2010/main" xmlns="">
+              <a14:hiddenFill xmlns="" xmlns:a14="http://schemas.microsoft.com/office/drawing/2010/main">
                 <a:solidFill>
                   <a:srgbClr val="FFFFFF"/>
                 </a:solidFill>
@@ -6603,10 +6364,10 @@
           <p:nvPr/>
         </p:nvPicPr>
         <p:blipFill>
-          <a:blip r:embed="rId5" cstate="print">
+          <a:blip r:embed="rId3" cstate="print">
             <a:extLst>
               <a:ext uri="{28A0092B-C50C-407E-A947-70E740481C1C}">
-                <a14:useLocalDpi xmlns:a14="http://schemas.microsoft.com/office/drawing/2010/main" xmlns="" val="0"/>
+                <a14:useLocalDpi xmlns="" xmlns:a14="http://schemas.microsoft.com/office/drawing/2010/main" val="0"/>
               </a:ext>
             </a:extLst>
           </a:blip>
@@ -6617,7 +6378,7 @@
         </p:blipFill>
         <p:spPr bwMode="auto">
           <a:xfrm>
-            <a:off x="7531623" y="2043901"/>
+            <a:off x="7483998" y="2053426"/>
             <a:ext cx="1123122" cy="811857"/>
           </a:xfrm>
           <a:prstGeom prst="rect">
@@ -6626,7 +6387,7 @@
           <a:noFill/>
           <a:extLst>
             <a:ext uri="{909E8E84-426E-40DD-AFC4-6F175D3DCCD1}">
-              <a14:hiddenFill xmlns:a14="http://schemas.microsoft.com/office/drawing/2010/main" xmlns="">
+              <a14:hiddenFill xmlns="" xmlns:a14="http://schemas.microsoft.com/office/drawing/2010/main">
                 <a:solidFill>
                   <a:srgbClr val="FFFFFF"/>
                 </a:solidFill>
@@ -6643,7 +6404,7 @@
         </p:nvSpPr>
         <p:spPr>
           <a:xfrm>
-            <a:off x="6833509" y="2010231"/>
+            <a:off x="6833509" y="2019756"/>
             <a:ext cx="739378" cy="479649"/>
           </a:xfrm>
           <a:prstGeom prst="roundRect">
@@ -6693,7 +6454,7 @@
         </p:nvSpPr>
         <p:spPr>
           <a:xfrm>
-            <a:off x="6891832" y="2134518"/>
+            <a:off x="6891832" y="2144043"/>
             <a:ext cx="639791" cy="215444"/>
           </a:xfrm>
           <a:prstGeom prst="rect">
@@ -6777,7 +6538,7 @@
         </p:nvSpPr>
         <p:spPr>
           <a:xfrm>
-            <a:off x="5874767" y="2223626"/>
+            <a:off x="5874767" y="2233151"/>
             <a:ext cx="950178" cy="52861"/>
           </a:xfrm>
           <a:prstGeom prst="rect">
@@ -6830,10 +6591,10 @@
           <p:nvPr/>
         </p:nvPicPr>
         <p:blipFill>
-          <a:blip r:embed="rId6" cstate="print">
+          <a:blip r:embed="rId4" cstate="print">
             <a:extLst>
               <a:ext uri="{28A0092B-C50C-407E-A947-70E740481C1C}">
-                <a14:useLocalDpi xmlns:a14="http://schemas.microsoft.com/office/drawing/2010/main" xmlns="" val="0"/>
+                <a14:useLocalDpi xmlns="" xmlns:a14="http://schemas.microsoft.com/office/drawing/2010/main" val="0"/>
               </a:ext>
             </a:extLst>
           </a:blip>
@@ -6844,7 +6605,7 @@
         </p:blipFill>
         <p:spPr bwMode="auto">
           <a:xfrm>
-            <a:off x="4085830" y="3260445"/>
+            <a:off x="4047730" y="3260445"/>
             <a:ext cx="609600" cy="609600"/>
           </a:xfrm>
           <a:prstGeom prst="rect">
@@ -6853,7 +6614,7 @@
           <a:noFill/>
           <a:extLst>
             <a:ext uri="{909E8E84-426E-40DD-AFC4-6F175D3DCCD1}">
-              <a14:hiddenFill xmlns:a14="http://schemas.microsoft.com/office/drawing/2010/main" xmlns="">
+              <a14:hiddenFill xmlns="" xmlns:a14="http://schemas.microsoft.com/office/drawing/2010/main">
                 <a:solidFill>
                   <a:srgbClr val="FFFFFF"/>
                 </a:solidFill>
@@ -6871,10 +6632,10 @@
           <p:nvPr/>
         </p:nvPicPr>
         <p:blipFill>
-          <a:blip r:embed="rId6" cstate="print">
+          <a:blip r:embed="rId4" cstate="print">
             <a:extLst>
               <a:ext uri="{28A0092B-C50C-407E-A947-70E740481C1C}">
-                <a14:useLocalDpi xmlns:a14="http://schemas.microsoft.com/office/drawing/2010/main" xmlns="" val="0"/>
+                <a14:useLocalDpi xmlns="" xmlns:a14="http://schemas.microsoft.com/office/drawing/2010/main" val="0"/>
               </a:ext>
             </a:extLst>
           </a:blip>
@@ -6894,7 +6655,7 @@
           <a:noFill/>
           <a:extLst>
             <a:ext uri="{909E8E84-426E-40DD-AFC4-6F175D3DCCD1}">
-              <a14:hiddenFill xmlns:a14="http://schemas.microsoft.com/office/drawing/2010/main" xmlns="">
+              <a14:hiddenFill xmlns="" xmlns:a14="http://schemas.microsoft.com/office/drawing/2010/main">
                 <a:solidFill>
                   <a:srgbClr val="FFFFFF"/>
                 </a:solidFill>
@@ -6964,10 +6725,10 @@
           <p:nvPr/>
         </p:nvPicPr>
         <p:blipFill>
-          <a:blip r:embed="rId7" cstate="print">
+          <a:blip r:embed="rId5" cstate="print">
             <a:extLst>
               <a:ext uri="{28A0092B-C50C-407E-A947-70E740481C1C}">
-                <a14:useLocalDpi xmlns:a14="http://schemas.microsoft.com/office/drawing/2010/main" xmlns="" val="0"/>
+                <a14:useLocalDpi xmlns="" xmlns:a14="http://schemas.microsoft.com/office/drawing/2010/main" val="0"/>
               </a:ext>
             </a:extLst>
           </a:blip>
@@ -6993,7 +6754,7 @@
         </p:nvSpPr>
         <p:spPr>
           <a:xfrm>
-            <a:off x="5099067" y="1995045"/>
+            <a:off x="5099067" y="2004570"/>
             <a:ext cx="739378" cy="479649"/>
           </a:xfrm>
           <a:prstGeom prst="roundRect">
@@ -7043,7 +6804,7 @@
         </p:nvSpPr>
         <p:spPr>
           <a:xfrm>
-            <a:off x="5139817" y="2114667"/>
+            <a:off x="5139817" y="2124192"/>
             <a:ext cx="645177" cy="215444"/>
           </a:xfrm>
           <a:prstGeom prst="rect">
@@ -7069,32 +6830,246 @@
       </p:sp>
       <p:sp>
         <p:nvSpPr>
-          <p:cNvPr id="3" name="Slide Number Placeholder 2"/>
-          <p:cNvSpPr>
-            <a:spLocks noGrp="1"/>
-          </p:cNvSpPr>
-          <p:nvPr>
-            <p:ph type="sldNum" sz="quarter" idx="12"/>
-          </p:nvPr>
-        </p:nvSpPr>
-        <p:spPr/>
-        <p:txBody>
-          <a:bodyPr/>
-          <a:lstStyle/>
-          <a:p>
-            <a:fld id="{B56F619D-4FD4-4D86-AB8A-1A06ED0FC7AA}" type="slidenum">
-              <a:rPr kumimoji="1" lang="ja-JP" altLang="en-US" smtClean="0"/>
-              <a:pPr/>
-              <a:t>7</a:t>
-            </a:fld>
-            <a:endParaRPr kumimoji="1" lang="ja-JP" altLang="en-US"/>
-          </a:p>
-        </p:txBody>
-      </p:sp>
+          <p:cNvPr id="33" name="Gleichschenkliges Dreieck 32"/>
+          <p:cNvSpPr/>
+          <p:nvPr/>
+        </p:nvSpPr>
+        <p:spPr>
+          <a:xfrm rot="1258602">
+            <a:off x="854864" y="1790807"/>
+            <a:ext cx="1412094" cy="1070390"/>
+          </a:xfrm>
+          <a:prstGeom prst="triangle">
+            <a:avLst>
+              <a:gd name="adj" fmla="val 69983"/>
+            </a:avLst>
+          </a:prstGeom>
+          <a:solidFill>
+            <a:schemeClr val="bg1"/>
+          </a:solidFill>
+          <a:ln>
+            <a:noFill/>
+          </a:ln>
+        </p:spPr>
+        <p:style>
+          <a:lnRef idx="2">
+            <a:schemeClr val="accent1">
+              <a:shade val="50000"/>
+            </a:schemeClr>
+          </a:lnRef>
+          <a:fillRef idx="1">
+            <a:schemeClr val="accent1"/>
+          </a:fillRef>
+          <a:effectRef idx="0">
+            <a:schemeClr val="accent1"/>
+          </a:effectRef>
+          <a:fontRef idx="minor">
+            <a:schemeClr val="lt1"/>
+          </a:fontRef>
+        </p:style>
+        <p:txBody>
+          <a:bodyPr rtlCol="0" anchor="ctr"/>
+          <a:lstStyle/>
+          <a:p>
+            <a:pPr algn="ctr"/>
+            <a:endParaRPr lang="de-DE"/>
+          </a:p>
+        </p:txBody>
+      </p:sp>
+      <p:pic>
+        <p:nvPicPr>
+          <p:cNvPr id="2050" name="Picture 2" descr="http://www.freeiconspng.com/uploads/factory-icon--vista-business-icons--softiconsm-28.png"/>
+          <p:cNvPicPr>
+            <a:picLocks noChangeAspect="1" noChangeArrowheads="1"/>
+          </p:cNvPicPr>
+          <p:nvPr/>
+        </p:nvPicPr>
+        <p:blipFill>
+          <a:blip r:embed="rId6" cstate="print"/>
+          <a:srcRect/>
+          <a:stretch>
+            <a:fillRect/>
+          </a:stretch>
+        </p:blipFill>
+        <p:spPr bwMode="auto">
+          <a:xfrm>
+            <a:off x="395536" y="1196752"/>
+            <a:ext cx="1728192" cy="1728192"/>
+          </a:xfrm>
+          <a:prstGeom prst="rect">
+            <a:avLst/>
+          </a:prstGeom>
+          <a:noFill/>
+        </p:spPr>
+      </p:pic>
+      <p:pic>
+        <p:nvPicPr>
+          <p:cNvPr id="1028" name="Picture 4" descr="C:\Users\knimura\AppData\Local\Microsoft\Windows\Temporary Internet Files\Content.IE5\8TTJABOM\Nuvola_filesystems_server[1].png"/>
+          <p:cNvPicPr>
+            <a:picLocks noChangeAspect="1" noChangeArrowheads="1"/>
+          </p:cNvPicPr>
+          <p:nvPr/>
+        </p:nvPicPr>
+        <p:blipFill>
+          <a:blip r:embed="rId7" cstate="print">
+            <a:extLst>
+              <a:ext uri="{28A0092B-C50C-407E-A947-70E740481C1C}">
+                <a14:useLocalDpi xmlns="" xmlns:a14="http://schemas.microsoft.com/office/drawing/2010/main" val="0"/>
+              </a:ext>
+            </a:extLst>
+          </a:blip>
+          <a:srcRect/>
+          <a:stretch>
+            <a:fillRect/>
+          </a:stretch>
+        </p:blipFill>
+        <p:spPr bwMode="auto">
+          <a:xfrm>
+            <a:off x="2467785" y="4385760"/>
+            <a:ext cx="609600" cy="609600"/>
+          </a:xfrm>
+          <a:prstGeom prst="rect">
+            <a:avLst/>
+          </a:prstGeom>
+          <a:noFill/>
+          <a:extLst>
+            <a:ext uri="{909E8E84-426E-40DD-AFC4-6F175D3DCCD1}">
+              <a14:hiddenFill xmlns="" xmlns:a14="http://schemas.microsoft.com/office/drawing/2010/main">
+                <a:solidFill>
+                  <a:srgbClr val="FFFFFF"/>
+                </a:solidFill>
+              </a14:hiddenFill>
+            </a:ext>
+          </a:extLst>
+        </p:spPr>
+      </p:pic>
+      <p:pic>
+        <p:nvPicPr>
+          <p:cNvPr id="38" name="Picture 4" descr="C:\Users\knimura\AppData\Local\Microsoft\Windows\Temporary Internet Files\Content.IE5\8TTJABOM\Nuvola_filesystems_server[1].png"/>
+          <p:cNvPicPr>
+            <a:picLocks noChangeAspect="1" noChangeArrowheads="1"/>
+          </p:cNvPicPr>
+          <p:nvPr/>
+        </p:nvPicPr>
+        <p:blipFill>
+          <a:blip r:embed="rId7" cstate="print">
+            <a:extLst>
+              <a:ext uri="{28A0092B-C50C-407E-A947-70E740481C1C}">
+                <a14:useLocalDpi xmlns="" xmlns:a14="http://schemas.microsoft.com/office/drawing/2010/main" val="0"/>
+              </a:ext>
+            </a:extLst>
+          </a:blip>
+          <a:srcRect/>
+          <a:stretch>
+            <a:fillRect/>
+          </a:stretch>
+        </p:blipFill>
+        <p:spPr bwMode="auto">
+          <a:xfrm>
+            <a:off x="3217342" y="4386624"/>
+            <a:ext cx="609600" cy="609600"/>
+          </a:xfrm>
+          <a:prstGeom prst="rect">
+            <a:avLst/>
+          </a:prstGeom>
+          <a:noFill/>
+          <a:extLst>
+            <a:ext uri="{909E8E84-426E-40DD-AFC4-6F175D3DCCD1}">
+              <a14:hiddenFill xmlns="" xmlns:a14="http://schemas.microsoft.com/office/drawing/2010/main">
+                <a:solidFill>
+                  <a:srgbClr val="FFFFFF"/>
+                </a:solidFill>
+              </a14:hiddenFill>
+            </a:ext>
+          </a:extLst>
+        </p:spPr>
+      </p:pic>
+      <p:pic>
+        <p:nvPicPr>
+          <p:cNvPr id="52" name="Picture 4" descr="C:\Users\knimura\AppData\Local\Microsoft\Windows\Temporary Internet Files\Content.IE5\8TTJABOM\Nuvola_filesystems_server[1].png"/>
+          <p:cNvPicPr>
+            <a:picLocks noChangeAspect="1" noChangeArrowheads="1"/>
+          </p:cNvPicPr>
+          <p:nvPr/>
+        </p:nvPicPr>
+        <p:blipFill>
+          <a:blip r:embed="rId7" cstate="print">
+            <a:extLst>
+              <a:ext uri="{28A0092B-C50C-407E-A947-70E740481C1C}">
+                <a14:useLocalDpi xmlns="" xmlns:a14="http://schemas.microsoft.com/office/drawing/2010/main" val="0"/>
+              </a:ext>
+            </a:extLst>
+          </a:blip>
+          <a:srcRect/>
+          <a:stretch>
+            <a:fillRect/>
+          </a:stretch>
+        </p:blipFill>
+        <p:spPr bwMode="auto">
+          <a:xfrm>
+            <a:off x="2214815" y="3048136"/>
+            <a:ext cx="609600" cy="609600"/>
+          </a:xfrm>
+          <a:prstGeom prst="rect">
+            <a:avLst/>
+          </a:prstGeom>
+          <a:noFill/>
+          <a:extLst>
+            <a:ext uri="{909E8E84-426E-40DD-AFC4-6F175D3DCCD1}">
+              <a14:hiddenFill xmlns="" xmlns:a14="http://schemas.microsoft.com/office/drawing/2010/main">
+                <a:solidFill>
+                  <a:srgbClr val="FFFFFF"/>
+                </a:solidFill>
+              </a14:hiddenFill>
+            </a:ext>
+          </a:extLst>
+        </p:spPr>
+      </p:pic>
+      <p:pic>
+        <p:nvPicPr>
+          <p:cNvPr id="54" name="Picture 4" descr="C:\Users\knimura\AppData\Local\Microsoft\Windows\Temporary Internet Files\Content.IE5\8TTJABOM\Nuvola_filesystems_server[1].png"/>
+          <p:cNvPicPr>
+            <a:picLocks noChangeAspect="1" noChangeArrowheads="1"/>
+          </p:cNvPicPr>
+          <p:nvPr/>
+        </p:nvPicPr>
+        <p:blipFill>
+          <a:blip r:embed="rId7" cstate="print">
+            <a:extLst>
+              <a:ext uri="{28A0092B-C50C-407E-A947-70E740481C1C}">
+                <a14:useLocalDpi xmlns="" xmlns:a14="http://schemas.microsoft.com/office/drawing/2010/main" val="0"/>
+              </a:ext>
+            </a:extLst>
+          </a:blip>
+          <a:srcRect/>
+          <a:stretch>
+            <a:fillRect/>
+          </a:stretch>
+        </p:blipFill>
+        <p:spPr bwMode="auto">
+          <a:xfrm>
+            <a:off x="2882280" y="3049000"/>
+            <a:ext cx="609600" cy="609600"/>
+          </a:xfrm>
+          <a:prstGeom prst="rect">
+            <a:avLst/>
+          </a:prstGeom>
+          <a:noFill/>
+          <a:extLst>
+            <a:ext uri="{909E8E84-426E-40DD-AFC4-6F175D3DCCD1}">
+              <a14:hiddenFill xmlns="" xmlns:a14="http://schemas.microsoft.com/office/drawing/2010/main">
+                <a:solidFill>
+                  <a:srgbClr val="FFFFFF"/>
+                </a:solidFill>
+              </a14:hiddenFill>
+            </a:ext>
+          </a:extLst>
+        </p:spPr>
+      </p:pic>
     </p:spTree>
     <p:extLst>
       <p:ext uri="{BB962C8B-B14F-4D97-AF65-F5344CB8AC3E}">
-        <p14:creationId xmlns:p14="http://schemas.microsoft.com/office/powerpoint/2010/main" xmlns="" val="4144254625"/>
+        <p14:creationId xmlns="" xmlns:p14="http://schemas.microsoft.com/office/powerpoint/2010/main" val="4144254625"/>
       </p:ext>
     </p:extLst>
   </p:cSld>
@@ -7128,49 +7103,39 @@
           <a:chExt cx="0" cy="0"/>
         </a:xfrm>
       </p:grpSpPr>
-      <p:sp>
-        <p:nvSpPr>
-          <p:cNvPr id="22" name="雲 21"/>
-          <p:cNvSpPr/>
-          <p:nvPr/>
-        </p:nvSpPr>
-        <p:spPr>
-          <a:xfrm>
-            <a:off x="4804245" y="1858582"/>
-            <a:ext cx="1927995" cy="1122912"/>
-          </a:xfrm>
-          <a:prstGeom prst="cloud">
-            <a:avLst/>
-          </a:prstGeom>
-          <a:solidFill>
-            <a:schemeClr val="bg1"/>
-          </a:solidFill>
+      <p:cxnSp>
+        <p:nvCxnSpPr>
+          <p:cNvPr id="25" name="直線矢印コネクタ 24"/>
+          <p:cNvCxnSpPr/>
+          <p:nvPr/>
+        </p:nvCxnSpPr>
+        <p:spPr>
+          <a:xfrm flipV="1">
+            <a:off x="6094599" y="3044536"/>
+            <a:ext cx="0" cy="1214844"/>
+          </a:xfrm>
+          <a:prstGeom prst="straightConnector1">
+            <a:avLst/>
+          </a:prstGeom>
+          <a:ln>
+            <a:tailEnd type="arrow"/>
+          </a:ln>
         </p:spPr>
         <p:style>
-          <a:lnRef idx="2">
-            <a:schemeClr val="accent1">
-              <a:shade val="50000"/>
-            </a:schemeClr>
+          <a:lnRef idx="1">
+            <a:schemeClr val="accent1"/>
           </a:lnRef>
-          <a:fillRef idx="1">
+          <a:fillRef idx="0">
             <a:schemeClr val="accent1"/>
           </a:fillRef>
           <a:effectRef idx="0">
             <a:schemeClr val="accent1"/>
           </a:effectRef>
           <a:fontRef idx="minor">
-            <a:schemeClr val="lt1"/>
+            <a:schemeClr val="tx1"/>
           </a:fontRef>
         </p:style>
-        <p:txBody>
-          <a:bodyPr rtlCol="0" anchor="ctr"/>
-          <a:lstStyle/>
-          <a:p>
-            <a:pPr algn="ctr"/>
-            <a:endParaRPr kumimoji="1" lang="ja-JP" altLang="en-US"/>
-          </a:p>
-        </p:txBody>
-      </p:sp>
+      </p:cxnSp>
       <p:sp>
         <p:nvSpPr>
           <p:cNvPr id="39" name="正方形/長方形 38"/>
@@ -7265,7 +7230,7 @@
           <a:blip r:embed="rId2" cstate="print">
             <a:extLst>
               <a:ext uri="{28A0092B-C50C-407E-A947-70E740481C1C}">
-                <a14:useLocalDpi xmlns:a14="http://schemas.microsoft.com/office/drawing/2010/main" xmlns="" val="0"/>
+                <a14:useLocalDpi xmlns="" xmlns:a14="http://schemas.microsoft.com/office/drawing/2010/main" val="0"/>
               </a:ext>
             </a:extLst>
           </a:blip>
@@ -7285,7 +7250,7 @@
           <a:noFill/>
           <a:extLst>
             <a:ext uri="{909E8E84-426E-40DD-AFC4-6F175D3DCCD1}">
-              <a14:hiddenFill xmlns:a14="http://schemas.microsoft.com/office/drawing/2010/main" xmlns="">
+              <a14:hiddenFill xmlns="" xmlns:a14="http://schemas.microsoft.com/office/drawing/2010/main">
                 <a:solidFill>
                   <a:srgbClr val="FFFFFF"/>
                 </a:solidFill>
@@ -7306,7 +7271,7 @@
           <a:blip r:embed="rId2" cstate="print">
             <a:extLst>
               <a:ext uri="{28A0092B-C50C-407E-A947-70E740481C1C}">
-                <a14:useLocalDpi xmlns:a14="http://schemas.microsoft.com/office/drawing/2010/main" xmlns="" val="0"/>
+                <a14:useLocalDpi xmlns="" xmlns:a14="http://schemas.microsoft.com/office/drawing/2010/main" val="0"/>
               </a:ext>
             </a:extLst>
           </a:blip>
@@ -7326,7 +7291,7 @@
           <a:noFill/>
           <a:extLst>
             <a:ext uri="{909E8E84-426E-40DD-AFC4-6F175D3DCCD1}">
-              <a14:hiddenFill xmlns:a14="http://schemas.microsoft.com/office/drawing/2010/main" xmlns="">
+              <a14:hiddenFill xmlns="" xmlns:a14="http://schemas.microsoft.com/office/drawing/2010/main">
                 <a:solidFill>
                   <a:srgbClr val="FFFFFF"/>
                 </a:solidFill>
@@ -7335,15 +7300,106 @@
           </a:extLst>
         </p:spPr>
       </p:pic>
-      <p:sp>
-        <p:nvSpPr>
-          <p:cNvPr id="43" name="正方形/長方形 42"/>
+      <p:pic>
+        <p:nvPicPr>
+          <p:cNvPr id="44" name="Picture 6" descr="C:\Users\knimura\AppData\Local\Microsoft\Windows\Temporary Internet Files\Content.IE5\2T0DMC6R\lgi01a201311262300[1].jpg"/>
+          <p:cNvPicPr>
+            <a:picLocks noChangeAspect="1" noChangeArrowheads="1"/>
+          </p:cNvPicPr>
+          <p:nvPr/>
+        </p:nvPicPr>
+        <p:blipFill>
+          <a:blip r:embed="rId2" cstate="print">
+            <a:extLst>
+              <a:ext uri="{28A0092B-C50C-407E-A947-70E740481C1C}">
+                <a14:useLocalDpi xmlns="" xmlns:a14="http://schemas.microsoft.com/office/drawing/2010/main" val="0"/>
+              </a:ext>
+            </a:extLst>
+          </a:blip>
+          <a:srcRect/>
+          <a:stretch>
+            <a:fillRect/>
+          </a:stretch>
+        </p:blipFill>
+        <p:spPr bwMode="auto">
+          <a:xfrm>
+            <a:off x="4215121" y="4073642"/>
+            <a:ext cx="608505" cy="273946"/>
+          </a:xfrm>
+          <a:prstGeom prst="rect">
+            <a:avLst/>
+          </a:prstGeom>
+          <a:noFill/>
+          <a:extLst>
+            <a:ext uri="{909E8E84-426E-40DD-AFC4-6F175D3DCCD1}">
+              <a14:hiddenFill xmlns="" xmlns:a14="http://schemas.microsoft.com/office/drawing/2010/main">
+                <a:solidFill>
+                  <a:srgbClr val="FFFFFF"/>
+                </a:solidFill>
+              </a14:hiddenFill>
+            </a:ext>
+          </a:extLst>
+        </p:spPr>
+      </p:pic>
+      <p:sp>
+        <p:nvSpPr>
+          <p:cNvPr id="47" name="角丸四角形 46"/>
           <p:cNvSpPr/>
           <p:nvPr/>
         </p:nvSpPr>
         <p:spPr>
           <a:xfrm>
-            <a:off x="3458956" y="4155136"/>
+            <a:off x="2278174" y="4052870"/>
+            <a:ext cx="3175891" cy="672273"/>
+          </a:xfrm>
+          <a:prstGeom prst="roundRect">
+            <a:avLst/>
+          </a:prstGeom>
+          <a:solidFill>
+            <a:schemeClr val="bg1"/>
+          </a:solidFill>
+          <a:ln w="57150">
+            <a:solidFill>
+              <a:schemeClr val="bg1">
+                <a:lumMod val="75000"/>
+              </a:schemeClr>
+            </a:solidFill>
+          </a:ln>
+        </p:spPr>
+        <p:style>
+          <a:lnRef idx="2">
+            <a:schemeClr val="accent1">
+              <a:shade val="50000"/>
+            </a:schemeClr>
+          </a:lnRef>
+          <a:fillRef idx="1">
+            <a:schemeClr val="accent1"/>
+          </a:fillRef>
+          <a:effectRef idx="0">
+            <a:schemeClr val="accent1"/>
+          </a:effectRef>
+          <a:fontRef idx="minor">
+            <a:schemeClr val="lt1"/>
+          </a:fontRef>
+        </p:style>
+        <p:txBody>
+          <a:bodyPr rtlCol="0" anchor="ctr"/>
+          <a:lstStyle/>
+          <a:p>
+            <a:pPr algn="ctr"/>
+            <a:endParaRPr kumimoji="1" lang="ja-JP" altLang="en-US"/>
+          </a:p>
+        </p:txBody>
+      </p:sp>
+      <p:sp>
+        <p:nvSpPr>
+          <p:cNvPr id="48" name="正方形/長方形 47"/>
+          <p:cNvSpPr/>
+          <p:nvPr/>
+        </p:nvSpPr>
+        <p:spPr>
+          <a:xfrm>
+            <a:off x="3059734" y="4309893"/>
             <a:ext cx="377982" cy="49966"/>
           </a:xfrm>
           <a:prstGeom prst="rect">
@@ -7389,7 +7445,7 @@
       </p:sp>
       <p:pic>
         <p:nvPicPr>
-          <p:cNvPr id="44" name="Picture 6" descr="C:\Users\knimura\AppData\Local\Microsoft\Windows\Temporary Internet Files\Content.IE5\2T0DMC6R\lgi01a201311262300[1].jpg"/>
+          <p:cNvPr id="50" name="Picture 6" descr="C:\Users\knimura\AppData\Local\Microsoft\Windows\Temporary Internet Files\Content.IE5\2T0DMC6R\lgi01a201311262300[1].jpg"/>
           <p:cNvPicPr>
             <a:picLocks noChangeAspect="1" noChangeArrowheads="1"/>
           </p:cNvPicPr>
@@ -7399,7 +7455,7 @@
           <a:blip r:embed="rId2" cstate="print">
             <a:extLst>
               <a:ext uri="{28A0092B-C50C-407E-A947-70E740481C1C}">
-                <a14:useLocalDpi xmlns:a14="http://schemas.microsoft.com/office/drawing/2010/main" xmlns="" val="0"/>
+                <a14:useLocalDpi xmlns="" xmlns:a14="http://schemas.microsoft.com/office/drawing/2010/main" val="0"/>
               </a:ext>
             </a:extLst>
           </a:blip>
@@ -7410,7 +7466,7 @@
         </p:blipFill>
         <p:spPr bwMode="auto">
           <a:xfrm>
-            <a:off x="4215122" y="4073642"/>
+            <a:off x="2502583" y="4205271"/>
             <a:ext cx="608505" cy="273946"/>
           </a:xfrm>
           <a:prstGeom prst="rect">
@@ -7419,7 +7475,7 @@
           <a:noFill/>
           <a:extLst>
             <a:ext uri="{909E8E84-426E-40DD-AFC4-6F175D3DCCD1}">
-              <a14:hiddenFill xmlns:a14="http://schemas.microsoft.com/office/drawing/2010/main" xmlns="">
+              <a14:hiddenFill xmlns="" xmlns:a14="http://schemas.microsoft.com/office/drawing/2010/main">
                 <a:solidFill>
                   <a:srgbClr val="FFFFFF"/>
                 </a:solidFill>
@@ -7430,64 +7486,14 @@
       </p:pic>
       <p:sp>
         <p:nvSpPr>
-          <p:cNvPr id="47" name="角丸四角形 46"/>
+          <p:cNvPr id="52" name="正方形/長方形 51"/>
           <p:cNvSpPr/>
           <p:nvPr/>
         </p:nvSpPr>
         <p:spPr>
           <a:xfrm>
-            <a:off x="2278174" y="4052870"/>
-            <a:ext cx="3175891" cy="672273"/>
-          </a:xfrm>
-          <a:prstGeom prst="roundRect">
-            <a:avLst/>
-          </a:prstGeom>
-          <a:solidFill>
-            <a:schemeClr val="bg1"/>
-          </a:solidFill>
-          <a:ln w="57150">
-            <a:solidFill>
-              <a:schemeClr val="bg1">
-                <a:lumMod val="75000"/>
-              </a:schemeClr>
-            </a:solidFill>
-          </a:ln>
-        </p:spPr>
-        <p:style>
-          <a:lnRef idx="2">
-            <a:schemeClr val="accent1">
-              <a:shade val="50000"/>
-            </a:schemeClr>
-          </a:lnRef>
-          <a:fillRef idx="1">
-            <a:schemeClr val="accent1"/>
-          </a:fillRef>
-          <a:effectRef idx="0">
-            <a:schemeClr val="accent1"/>
-          </a:effectRef>
-          <a:fontRef idx="minor">
-            <a:schemeClr val="lt1"/>
-          </a:fontRef>
-        </p:style>
-        <p:txBody>
-          <a:bodyPr rtlCol="0" anchor="ctr"/>
-          <a:lstStyle/>
-          <a:p>
-            <a:pPr algn="ctr"/>
-            <a:endParaRPr kumimoji="1" lang="ja-JP" altLang="en-US"/>
-          </a:p>
-        </p:txBody>
-      </p:sp>
-      <p:sp>
-        <p:nvSpPr>
-          <p:cNvPr id="48" name="正方形/長方形 47"/>
-          <p:cNvSpPr/>
-          <p:nvPr/>
-        </p:nvSpPr>
-        <p:spPr>
-          <a:xfrm>
-            <a:off x="3059734" y="4309893"/>
-            <a:ext cx="377982" cy="49966"/>
+            <a:off x="3869465" y="4311782"/>
+            <a:ext cx="523619" cy="45719"/>
           </a:xfrm>
           <a:prstGeom prst="rect">
             <a:avLst/>
@@ -7530,9 +7536,59 @@
           </a:p>
         </p:txBody>
       </p:sp>
+      <p:sp>
+        <p:nvSpPr>
+          <p:cNvPr id="62" name="角丸四角形 61"/>
+          <p:cNvSpPr/>
+          <p:nvPr/>
+        </p:nvSpPr>
+        <p:spPr>
+          <a:xfrm>
+            <a:off x="4253285" y="3284984"/>
+            <a:ext cx="948328" cy="545735"/>
+          </a:xfrm>
+          <a:prstGeom prst="roundRect">
+            <a:avLst/>
+          </a:prstGeom>
+          <a:solidFill>
+            <a:schemeClr val="bg1"/>
+          </a:solidFill>
+          <a:ln w="57150">
+            <a:solidFill>
+              <a:schemeClr val="bg1">
+                <a:lumMod val="75000"/>
+              </a:schemeClr>
+            </a:solidFill>
+          </a:ln>
+        </p:spPr>
+        <p:style>
+          <a:lnRef idx="2">
+            <a:schemeClr val="accent1">
+              <a:shade val="50000"/>
+            </a:schemeClr>
+          </a:lnRef>
+          <a:fillRef idx="1">
+            <a:schemeClr val="accent1"/>
+          </a:fillRef>
+          <a:effectRef idx="0">
+            <a:schemeClr val="accent1"/>
+          </a:effectRef>
+          <a:fontRef idx="minor">
+            <a:schemeClr val="lt1"/>
+          </a:fontRef>
+        </p:style>
+        <p:txBody>
+          <a:bodyPr rtlCol="0" anchor="ctr"/>
+          <a:lstStyle/>
+          <a:p>
+            <a:pPr algn="ctr"/>
+            <a:endParaRPr kumimoji="1" lang="ja-JP" altLang="en-US" b="1"/>
+          </a:p>
+        </p:txBody>
+      </p:sp>
       <p:pic>
         <p:nvPicPr>
-          <p:cNvPr id="50" name="Picture 6" descr="C:\Users\knimura\AppData\Local\Microsoft\Windows\Temporary Internet Files\Content.IE5\2T0DMC6R\lgi01a201311262300[1].jpg"/>
+          <p:cNvPr id="69" name="Picture 6" descr="C:\Users\knimura\AppData\Local\Microsoft\Windows\Temporary Internet Files\Content.IE5\2T0DMC6R\lgi01a201311262300[1].jpg"/>
           <p:cNvPicPr>
             <a:picLocks noChangeAspect="1" noChangeArrowheads="1"/>
           </p:cNvPicPr>
@@ -7542,7 +7598,7 @@
           <a:blip r:embed="rId2" cstate="print">
             <a:extLst>
               <a:ext uri="{28A0092B-C50C-407E-A947-70E740481C1C}">
-                <a14:useLocalDpi xmlns:a14="http://schemas.microsoft.com/office/drawing/2010/main" xmlns="" val="0"/>
+                <a14:useLocalDpi xmlns="" xmlns:a14="http://schemas.microsoft.com/office/drawing/2010/main" val="0"/>
               </a:ext>
             </a:extLst>
           </a:blip>
@@ -7553,7 +7609,7 @@
         </p:blipFill>
         <p:spPr bwMode="auto">
           <a:xfrm>
-            <a:off x="2502583" y="4205271"/>
+            <a:off x="4423196" y="3505516"/>
             <a:ext cx="608505" cy="273946"/>
           </a:xfrm>
           <a:prstGeom prst="rect">
@@ -7562,7 +7618,7 @@
           <a:noFill/>
           <a:extLst>
             <a:ext uri="{909E8E84-426E-40DD-AFC4-6F175D3DCCD1}">
-              <a14:hiddenFill xmlns:a14="http://schemas.microsoft.com/office/drawing/2010/main" xmlns="">
+              <a14:hiddenFill xmlns="" xmlns:a14="http://schemas.microsoft.com/office/drawing/2010/main">
                 <a:solidFill>
                   <a:srgbClr val="FFFFFF"/>
                 </a:solidFill>
@@ -7571,16 +7627,147 @@
           </a:extLst>
         </p:spPr>
       </p:pic>
-      <p:sp>
-        <p:nvSpPr>
-          <p:cNvPr id="52" name="正方形/長方形 51"/>
+      <p:pic>
+        <p:nvPicPr>
+          <p:cNvPr id="2052" name="Picture 4" descr="C:\Users\knimura\AppData\Local\Microsoft\Windows\Temporary Internet Files\Content.IE5\7S57FXLM\golf[1].jpg"/>
+          <p:cNvPicPr>
+            <a:picLocks noChangeAspect="1" noChangeArrowheads="1"/>
+          </p:cNvPicPr>
+          <p:nvPr/>
+        </p:nvPicPr>
+        <p:blipFill>
+          <a:blip r:embed="rId3" cstate="print">
+            <a:extLst>
+              <a:ext uri="{28A0092B-C50C-407E-A947-70E740481C1C}">
+                <a14:useLocalDpi xmlns="" xmlns:a14="http://schemas.microsoft.com/office/drawing/2010/main" val="0"/>
+              </a:ext>
+            </a:extLst>
+          </a:blip>
+          <a:srcRect/>
+          <a:stretch>
+            <a:fillRect/>
+          </a:stretch>
+        </p:blipFill>
+        <p:spPr bwMode="auto">
+          <a:xfrm>
+            <a:off x="1989237" y="3354448"/>
+            <a:ext cx="1232182" cy="821454"/>
+          </a:xfrm>
+          <a:prstGeom prst="rect">
+            <a:avLst/>
+          </a:prstGeom>
+          <a:noFill/>
+          <a:extLst>
+            <a:ext uri="{909E8E84-426E-40DD-AFC4-6F175D3DCCD1}">
+              <a14:hiddenFill xmlns="" xmlns:a14="http://schemas.microsoft.com/office/drawing/2010/main">
+                <a:solidFill>
+                  <a:srgbClr val="FFFFFF"/>
+                </a:solidFill>
+              </a14:hiddenFill>
+            </a:ext>
+          </a:extLst>
+        </p:spPr>
+      </p:pic>
+      <p:sp>
+        <p:nvSpPr>
+          <p:cNvPr id="13" name="四角形吹き出し 12"/>
           <p:cNvSpPr/>
           <p:nvPr/>
         </p:nvSpPr>
         <p:spPr>
           <a:xfrm>
-            <a:off x="3869465" y="4311782"/>
-            <a:ext cx="523619" cy="45719"/>
+            <a:off x="3158468" y="2446037"/>
+            <a:ext cx="1164233" cy="1102555"/>
+          </a:xfrm>
+          <a:prstGeom prst="wedgeRectCallout">
+            <a:avLst>
+              <a:gd name="adj1" fmla="val -82659"/>
+              <a:gd name="adj2" fmla="val 48889"/>
+            </a:avLst>
+          </a:prstGeom>
+          <a:solidFill>
+            <a:schemeClr val="bg1"/>
+          </a:solidFill>
+          <a:ln>
+            <a:solidFill>
+              <a:srgbClr val="385D8A"/>
+            </a:solidFill>
+          </a:ln>
+        </p:spPr>
+        <p:style>
+          <a:lnRef idx="2">
+            <a:schemeClr val="accent1">
+              <a:shade val="50000"/>
+            </a:schemeClr>
+          </a:lnRef>
+          <a:fillRef idx="1">
+            <a:schemeClr val="accent1"/>
+          </a:fillRef>
+          <a:effectRef idx="0">
+            <a:schemeClr val="accent1"/>
+          </a:effectRef>
+          <a:fontRef idx="minor">
+            <a:schemeClr val="lt1"/>
+          </a:fontRef>
+        </p:style>
+        <p:txBody>
+          <a:bodyPr rtlCol="0" anchor="ctr"/>
+          <a:lstStyle/>
+          <a:p>
+            <a:pPr algn="ctr"/>
+            <a:endParaRPr kumimoji="1" lang="ja-JP" altLang="en-US"/>
+          </a:p>
+        </p:txBody>
+      </p:sp>
+      <p:pic>
+        <p:nvPicPr>
+          <p:cNvPr id="2051" name="Picture 3" descr="C:\Users\knimura\AppData\Local\Microsoft\Windows\Temporary Internet Files\Content.IE5\0U8T2P6O\200_36[1].jpg"/>
+          <p:cNvPicPr>
+            <a:picLocks noChangeAspect="1" noChangeArrowheads="1"/>
+          </p:cNvPicPr>
+          <p:nvPr/>
+        </p:nvPicPr>
+        <p:blipFill rotWithShape="1">
+          <a:blip r:embed="rId4" cstate="print">
+            <a:extLst>
+              <a:ext uri="{28A0092B-C50C-407E-A947-70E740481C1C}">
+                <a14:useLocalDpi xmlns="" xmlns:a14="http://schemas.microsoft.com/office/drawing/2010/main" val="0"/>
+              </a:ext>
+            </a:extLst>
+          </a:blip>
+          <a:srcRect t="28732"/>
+          <a:stretch/>
+        </p:blipFill>
+        <p:spPr bwMode="auto">
+          <a:xfrm>
+            <a:off x="3193313" y="2474272"/>
+            <a:ext cx="1106528" cy="1051460"/>
+          </a:xfrm>
+          <a:prstGeom prst="rect">
+            <a:avLst/>
+          </a:prstGeom>
+          <a:noFill/>
+          <a:extLst>
+            <a:ext uri="{909E8E84-426E-40DD-AFC4-6F175D3DCCD1}">
+              <a14:hiddenFill xmlns="" xmlns:a14="http://schemas.microsoft.com/office/drawing/2010/main">
+                <a:solidFill>
+                  <a:srgbClr val="FFFFFF"/>
+                </a:solidFill>
+              </a14:hiddenFill>
+            </a:ext>
+          </a:extLst>
+        </p:spPr>
+      </p:pic>
+      <p:sp>
+        <p:nvSpPr>
+          <p:cNvPr id="72" name="正方形/長方形 71"/>
+          <p:cNvSpPr/>
+          <p:nvPr/>
+        </p:nvSpPr>
+        <p:spPr>
+          <a:xfrm rot="16200000">
+            <a:off x="5627460" y="3178622"/>
+            <a:ext cx="547949" cy="45719"/>
           </a:xfrm>
           <a:prstGeom prst="rect">
             <a:avLst/>
@@ -7623,59 +7810,9 @@
           </a:p>
         </p:txBody>
       </p:sp>
-      <p:sp>
-        <p:nvSpPr>
-          <p:cNvPr id="62" name="角丸四角形 61"/>
-          <p:cNvSpPr/>
-          <p:nvPr/>
-        </p:nvSpPr>
-        <p:spPr>
-          <a:xfrm>
-            <a:off x="4253285" y="3284984"/>
-            <a:ext cx="948328" cy="545735"/>
-          </a:xfrm>
-          <a:prstGeom prst="roundRect">
-            <a:avLst/>
-          </a:prstGeom>
-          <a:solidFill>
-            <a:schemeClr val="bg1"/>
-          </a:solidFill>
-          <a:ln w="57150">
-            <a:solidFill>
-              <a:schemeClr val="bg1">
-                <a:lumMod val="75000"/>
-              </a:schemeClr>
-            </a:solidFill>
-          </a:ln>
-        </p:spPr>
-        <p:style>
-          <a:lnRef idx="2">
-            <a:schemeClr val="accent1">
-              <a:shade val="50000"/>
-            </a:schemeClr>
-          </a:lnRef>
-          <a:fillRef idx="1">
-            <a:schemeClr val="accent1"/>
-          </a:fillRef>
-          <a:effectRef idx="0">
-            <a:schemeClr val="accent1"/>
-          </a:effectRef>
-          <a:fontRef idx="minor">
-            <a:schemeClr val="lt1"/>
-          </a:fontRef>
-        </p:style>
-        <p:txBody>
-          <a:bodyPr rtlCol="0" anchor="ctr"/>
-          <a:lstStyle/>
-          <a:p>
-            <a:pPr algn="ctr"/>
-            <a:endParaRPr kumimoji="1" lang="ja-JP" altLang="en-US" b="1"/>
-          </a:p>
-        </p:txBody>
-      </p:sp>
       <p:pic>
         <p:nvPicPr>
-          <p:cNvPr id="69" name="Picture 6" descr="C:\Users\knimura\AppData\Local\Microsoft\Windows\Temporary Internet Files\Content.IE5\2T0DMC6R\lgi01a201311262300[1].jpg"/>
+          <p:cNvPr id="51" name="Picture 6" descr="C:\Users\knimura\AppData\Local\Microsoft\Windows\Temporary Internet Files\Content.IE5\2T0DMC6R\lgi01a201311262300[1].jpg"/>
           <p:cNvPicPr>
             <a:picLocks noChangeAspect="1" noChangeArrowheads="1"/>
           </p:cNvPicPr>
@@ -7685,7 +7822,7 @@
           <a:blip r:embed="rId2" cstate="print">
             <a:extLst>
               <a:ext uri="{28A0092B-C50C-407E-A947-70E740481C1C}">
-                <a14:useLocalDpi xmlns:a14="http://schemas.microsoft.com/office/drawing/2010/main" xmlns="" val="0"/>
+                <a14:useLocalDpi xmlns="" xmlns:a14="http://schemas.microsoft.com/office/drawing/2010/main" val="0"/>
               </a:ext>
             </a:extLst>
           </a:blip>
@@ -7696,7 +7833,7 @@
         </p:blipFill>
         <p:spPr bwMode="auto">
           <a:xfrm>
-            <a:off x="4366407" y="3486466"/>
+            <a:off x="3336610" y="4197903"/>
             <a:ext cx="608505" cy="273946"/>
           </a:xfrm>
           <a:prstGeom prst="rect">
@@ -7705,7 +7842,7 @@
           <a:noFill/>
           <a:extLst>
             <a:ext uri="{909E8E84-426E-40DD-AFC4-6F175D3DCCD1}">
-              <a14:hiddenFill xmlns:a14="http://schemas.microsoft.com/office/drawing/2010/main" xmlns="">
+              <a14:hiddenFill xmlns="" xmlns:a14="http://schemas.microsoft.com/office/drawing/2010/main">
                 <a:solidFill>
                   <a:srgbClr val="FFFFFF"/>
                 </a:solidFill>
@@ -7714,147 +7851,46 @@
           </a:extLst>
         </p:spPr>
       </p:pic>
-      <p:pic>
-        <p:nvPicPr>
-          <p:cNvPr id="2052" name="Picture 4" descr="C:\Users\knimura\AppData\Local\Microsoft\Windows\Temporary Internet Files\Content.IE5\7S57FXLM\golf[1].jpg"/>
-          <p:cNvPicPr>
-            <a:picLocks noChangeAspect="1" noChangeArrowheads="1"/>
-          </p:cNvPicPr>
-          <p:nvPr/>
-        </p:nvPicPr>
-        <p:blipFill>
-          <a:blip r:embed="rId3" cstate="print">
-            <a:extLst>
-              <a:ext uri="{28A0092B-C50C-407E-A947-70E740481C1C}">
-                <a14:useLocalDpi xmlns:a14="http://schemas.microsoft.com/office/drawing/2010/main" xmlns="" val="0"/>
-              </a:ext>
-            </a:extLst>
-          </a:blip>
-          <a:srcRect/>
-          <a:stretch>
-            <a:fillRect/>
-          </a:stretch>
-        </p:blipFill>
-        <p:spPr bwMode="auto">
-          <a:xfrm>
-            <a:off x="1886492" y="3354448"/>
-            <a:ext cx="1232182" cy="821454"/>
+      <p:sp>
+        <p:nvSpPr>
+          <p:cNvPr id="49" name="テキスト ボックス 48"/>
+          <p:cNvSpPr txBox="1"/>
+          <p:nvPr/>
+        </p:nvSpPr>
+        <p:spPr>
+          <a:xfrm>
+            <a:off x="4864259" y="4042305"/>
+            <a:ext cx="500458" cy="307777"/>
           </a:xfrm>
           <a:prstGeom prst="rect">
             <a:avLst/>
           </a:prstGeom>
           <a:noFill/>
-          <a:extLst>
-            <a:ext uri="{909E8E84-426E-40DD-AFC4-6F175D3DCCD1}">
-              <a14:hiddenFill xmlns:a14="http://schemas.microsoft.com/office/drawing/2010/main" xmlns="">
-                <a:solidFill>
-                  <a:srgbClr val="FFFFFF"/>
-                </a:solidFill>
-              </a14:hiddenFill>
-            </a:ext>
-          </a:extLst>
-        </p:spPr>
-      </p:pic>
-      <p:sp>
-        <p:nvSpPr>
-          <p:cNvPr id="13" name="四角形吹き出し 12"/>
+        </p:spPr>
+        <p:txBody>
+          <a:bodyPr wrap="none" rtlCol="0">
+            <a:spAutoFit/>
+          </a:bodyPr>
+          <a:lstStyle/>
+          <a:p>
+            <a:r>
+              <a:rPr kumimoji="1" lang="en-US" altLang="ja-JP" sz="1400" dirty="0" smtClean="0"/>
+              <a:t>CAN</a:t>
+            </a:r>
+            <a:endParaRPr kumimoji="1" lang="ja-JP" altLang="en-US" sz="1400" dirty="0"/>
+          </a:p>
+        </p:txBody>
+      </p:sp>
+      <p:sp>
+        <p:nvSpPr>
+          <p:cNvPr id="32" name="正方形/長方形 31"/>
           <p:cNvSpPr/>
           <p:nvPr/>
         </p:nvSpPr>
         <p:spPr>
-          <a:xfrm>
-            <a:off x="3158468" y="2446037"/>
-            <a:ext cx="1164233" cy="1102555"/>
-          </a:xfrm>
-          <a:prstGeom prst="wedgeRectCallout">
-            <a:avLst>
-              <a:gd name="adj1" fmla="val -82659"/>
-              <a:gd name="adj2" fmla="val 48889"/>
-            </a:avLst>
-          </a:prstGeom>
-          <a:solidFill>
-            <a:schemeClr val="bg1"/>
-          </a:solidFill>
-          <a:ln>
-            <a:solidFill>
-              <a:srgbClr val="1782DB"/>
-            </a:solidFill>
-          </a:ln>
-        </p:spPr>
-        <p:style>
-          <a:lnRef idx="2">
-            <a:schemeClr val="accent1">
-              <a:shade val="50000"/>
-            </a:schemeClr>
-          </a:lnRef>
-          <a:fillRef idx="1">
-            <a:schemeClr val="accent1"/>
-          </a:fillRef>
-          <a:effectRef idx="0">
-            <a:schemeClr val="accent1"/>
-          </a:effectRef>
-          <a:fontRef idx="minor">
-            <a:schemeClr val="lt1"/>
-          </a:fontRef>
-        </p:style>
-        <p:txBody>
-          <a:bodyPr rtlCol="0" anchor="ctr"/>
-          <a:lstStyle/>
-          <a:p>
-            <a:pPr algn="ctr"/>
-            <a:endParaRPr kumimoji="1" lang="ja-JP" altLang="en-US"/>
-          </a:p>
-        </p:txBody>
-      </p:sp>
-      <p:pic>
-        <p:nvPicPr>
-          <p:cNvPr id="2051" name="Picture 3" descr="C:\Users\knimura\AppData\Local\Microsoft\Windows\Temporary Internet Files\Content.IE5\0U8T2P6O\200_36[1].jpg"/>
-          <p:cNvPicPr>
-            <a:picLocks noChangeAspect="1" noChangeArrowheads="1"/>
-          </p:cNvPicPr>
-          <p:nvPr/>
-        </p:nvPicPr>
-        <p:blipFill rotWithShape="1">
-          <a:blip r:embed="rId4" cstate="print">
-            <a:extLst>
-              <a:ext uri="{28A0092B-C50C-407E-A947-70E740481C1C}">
-                <a14:useLocalDpi xmlns:a14="http://schemas.microsoft.com/office/drawing/2010/main" xmlns="" val="0"/>
-              </a:ext>
-            </a:extLst>
-          </a:blip>
-          <a:srcRect t="28732"/>
-          <a:stretch/>
-        </p:blipFill>
-        <p:spPr bwMode="auto">
-          <a:xfrm>
-            <a:off x="3193313" y="2474272"/>
-            <a:ext cx="1106528" cy="1051460"/>
-          </a:xfrm>
-          <a:prstGeom prst="rect">
-            <a:avLst/>
-          </a:prstGeom>
-          <a:noFill/>
-          <a:extLst>
-            <a:ext uri="{909E8E84-426E-40DD-AFC4-6F175D3DCCD1}">
-              <a14:hiddenFill xmlns:a14="http://schemas.microsoft.com/office/drawing/2010/main" xmlns="">
-                <a:solidFill>
-                  <a:srgbClr val="FFFFFF"/>
-                </a:solidFill>
-              </a14:hiddenFill>
-            </a:ext>
-          </a:extLst>
-        </p:spPr>
-      </p:pic>
-      <p:sp>
-        <p:nvSpPr>
-          <p:cNvPr id="72" name="正方形/長方形 71"/>
-          <p:cNvSpPr/>
-          <p:nvPr/>
-        </p:nvSpPr>
-        <p:spPr>
           <a:xfrm rot="16200000">
-            <a:off x="5627460" y="3178622"/>
-            <a:ext cx="547949" cy="45719"/>
+            <a:off x="5597733" y="4020597"/>
+            <a:ext cx="607403" cy="45719"/>
           </a:xfrm>
           <a:prstGeom prst="rect">
             <a:avLst/>
@@ -7897,87 +7933,16 @@
           </a:p>
         </p:txBody>
       </p:sp>
-      <p:pic>
-        <p:nvPicPr>
-          <p:cNvPr id="51" name="Picture 6" descr="C:\Users\knimura\AppData\Local\Microsoft\Windows\Temporary Internet Files\Content.IE5\2T0DMC6R\lgi01a201311262300[1].jpg"/>
-          <p:cNvPicPr>
-            <a:picLocks noChangeAspect="1" noChangeArrowheads="1"/>
-          </p:cNvPicPr>
-          <p:nvPr/>
-        </p:nvPicPr>
-        <p:blipFill>
-          <a:blip r:embed="rId2" cstate="print">
-            <a:extLst>
-              <a:ext uri="{28A0092B-C50C-407E-A947-70E740481C1C}">
-                <a14:useLocalDpi xmlns:a14="http://schemas.microsoft.com/office/drawing/2010/main" xmlns="" val="0"/>
-              </a:ext>
-            </a:extLst>
-          </a:blip>
-          <a:srcRect/>
-          <a:stretch>
-            <a:fillRect/>
-          </a:stretch>
-        </p:blipFill>
-        <p:spPr bwMode="auto">
-          <a:xfrm>
-            <a:off x="3336610" y="4197903"/>
-            <a:ext cx="608505" cy="273946"/>
-          </a:xfrm>
-          <a:prstGeom prst="rect">
-            <a:avLst/>
-          </a:prstGeom>
-          <a:noFill/>
-          <a:extLst>
-            <a:ext uri="{909E8E84-426E-40DD-AFC4-6F175D3DCCD1}">
-              <a14:hiddenFill xmlns:a14="http://schemas.microsoft.com/office/drawing/2010/main" xmlns="">
-                <a:solidFill>
-                  <a:srgbClr val="FFFFFF"/>
-                </a:solidFill>
-              </a14:hiddenFill>
-            </a:ext>
-          </a:extLst>
-        </p:spPr>
-      </p:pic>
-      <p:sp>
-        <p:nvSpPr>
-          <p:cNvPr id="49" name="テキスト ボックス 48"/>
-          <p:cNvSpPr txBox="1"/>
-          <p:nvPr/>
-        </p:nvSpPr>
-        <p:spPr>
-          <a:xfrm>
-            <a:off x="4816634" y="4042305"/>
-            <a:ext cx="500458" cy="307777"/>
-          </a:xfrm>
-          <a:prstGeom prst="rect">
-            <a:avLst/>
-          </a:prstGeom>
-          <a:noFill/>
-        </p:spPr>
-        <p:txBody>
-          <a:bodyPr wrap="none" rtlCol="0">
-            <a:spAutoFit/>
-          </a:bodyPr>
-          <a:lstStyle/>
-          <a:p>
-            <a:r>
-              <a:rPr kumimoji="1" lang="en-US" altLang="ja-JP" sz="1400" dirty="0" smtClean="0"/>
-              <a:t>CAN</a:t>
-            </a:r>
-            <a:endParaRPr kumimoji="1" lang="ja-JP" altLang="en-US" sz="1400" dirty="0"/>
-          </a:p>
-        </p:txBody>
-      </p:sp>
-      <p:sp>
-        <p:nvSpPr>
-          <p:cNvPr id="32" name="正方形/長方形 31"/>
+      <p:sp>
+        <p:nvSpPr>
+          <p:cNvPr id="33" name="正方形/長方形 32"/>
           <p:cNvSpPr/>
           <p:nvPr/>
         </p:nvSpPr>
         <p:spPr>
-          <a:xfrm rot="16200000">
-            <a:off x="5597733" y="4020597"/>
-            <a:ext cx="607403" cy="45719"/>
+          <a:xfrm>
+            <a:off x="4670659" y="4307661"/>
+            <a:ext cx="1222995" cy="45719"/>
           </a:xfrm>
           <a:prstGeom prst="rect">
             <a:avLst/>
@@ -8022,14 +7987,14 @@
       </p:sp>
       <p:sp>
         <p:nvSpPr>
-          <p:cNvPr id="33" name="正方形/長方形 32"/>
+          <p:cNvPr id="35" name="正方形/長方形 34"/>
           <p:cNvSpPr/>
           <p:nvPr/>
         </p:nvSpPr>
         <p:spPr>
           <a:xfrm>
-            <a:off x="4670659" y="4307661"/>
-            <a:ext cx="1222995" cy="45719"/>
+            <a:off x="5217803" y="3581231"/>
+            <a:ext cx="690888" cy="45719"/>
           </a:xfrm>
           <a:prstGeom prst="rect">
             <a:avLst/>
@@ -8072,58 +8037,6 @@
           </a:p>
         </p:txBody>
       </p:sp>
-      <p:sp>
-        <p:nvSpPr>
-          <p:cNvPr id="35" name="正方形/長方形 34"/>
-          <p:cNvSpPr/>
-          <p:nvPr/>
-        </p:nvSpPr>
-        <p:spPr>
-          <a:xfrm>
-            <a:off x="5217803" y="3581231"/>
-            <a:ext cx="690888" cy="45719"/>
-          </a:xfrm>
-          <a:prstGeom prst="rect">
-            <a:avLst/>
-          </a:prstGeom>
-          <a:solidFill>
-            <a:schemeClr val="bg1">
-              <a:lumMod val="75000"/>
-            </a:schemeClr>
-          </a:solidFill>
-          <a:ln>
-            <a:solidFill>
-              <a:schemeClr val="bg1">
-                <a:lumMod val="75000"/>
-              </a:schemeClr>
-            </a:solidFill>
-          </a:ln>
-        </p:spPr>
-        <p:style>
-          <a:lnRef idx="2">
-            <a:schemeClr val="accent1">
-              <a:shade val="50000"/>
-            </a:schemeClr>
-          </a:lnRef>
-          <a:fillRef idx="1">
-            <a:schemeClr val="accent1"/>
-          </a:fillRef>
-          <a:effectRef idx="0">
-            <a:schemeClr val="accent1"/>
-          </a:effectRef>
-          <a:fontRef idx="minor">
-            <a:schemeClr val="lt1"/>
-          </a:fontRef>
-        </p:style>
-        <p:txBody>
-          <a:bodyPr rtlCol="0" anchor="ctr"/>
-          <a:lstStyle/>
-          <a:p>
-            <a:pPr algn="ctr"/>
-            <a:endParaRPr kumimoji="1" lang="ja-JP" altLang="en-US"/>
-          </a:p>
-        </p:txBody>
-      </p:sp>
       <p:pic>
         <p:nvPicPr>
           <p:cNvPr id="54" name="Picture 6" descr="C:\Users\knimura\AppData\Local\Microsoft\Windows\Temporary Internet Files\Content.IE5\2T0DMC6R\lgi01a201311262300[1].jpg"/>
@@ -8136,7 +8049,7 @@
           <a:blip r:embed="rId2" cstate="print">
             <a:extLst>
               <a:ext uri="{28A0092B-C50C-407E-A947-70E740481C1C}">
-                <a14:useLocalDpi xmlns:a14="http://schemas.microsoft.com/office/drawing/2010/main" xmlns="" val="0"/>
+                <a14:useLocalDpi xmlns="" xmlns:a14="http://schemas.microsoft.com/office/drawing/2010/main" val="0"/>
               </a:ext>
             </a:extLst>
           </a:blip>
@@ -8147,7 +8060,7 @@
         </p:blipFill>
         <p:spPr bwMode="auto">
           <a:xfrm>
-            <a:off x="4219932" y="4214178"/>
+            <a:off x="4215121" y="4214178"/>
             <a:ext cx="608505" cy="273946"/>
           </a:xfrm>
           <a:prstGeom prst="rect">
@@ -8156,7 +8069,7 @@
           <a:noFill/>
           <a:extLst>
             <a:ext uri="{909E8E84-426E-40DD-AFC4-6F175D3DCCD1}">
-              <a14:hiddenFill xmlns:a14="http://schemas.microsoft.com/office/drawing/2010/main" xmlns="">
+              <a14:hiddenFill xmlns="" xmlns:a14="http://schemas.microsoft.com/office/drawing/2010/main">
                 <a:solidFill>
                   <a:srgbClr val="FFFFFF"/>
                 </a:solidFill>
@@ -8165,49 +8078,16 @@
           </a:extLst>
         </p:spPr>
       </p:pic>
-      <p:cxnSp>
-        <p:nvCxnSpPr>
-          <p:cNvPr id="56" name="直線矢印コネクタ 55"/>
-          <p:cNvCxnSpPr/>
-          <p:nvPr/>
-        </p:nvCxnSpPr>
-        <p:spPr>
-          <a:xfrm flipH="1" flipV="1">
-            <a:off x="5330115" y="3133587"/>
-            <a:ext cx="404444" cy="7381"/>
-          </a:xfrm>
-          <a:prstGeom prst="straightConnector1">
-            <a:avLst/>
-          </a:prstGeom>
-          <a:ln>
-            <a:tailEnd type="arrow"/>
-          </a:ln>
-        </p:spPr>
-        <p:style>
-          <a:lnRef idx="1">
-            <a:schemeClr val="accent1"/>
-          </a:lnRef>
-          <a:fillRef idx="0">
-            <a:schemeClr val="accent1"/>
-          </a:fillRef>
-          <a:effectRef idx="0">
-            <a:schemeClr val="accent1"/>
-          </a:effectRef>
-          <a:fontRef idx="minor">
-            <a:schemeClr val="tx1"/>
-          </a:fontRef>
-        </p:style>
-      </p:cxnSp>
-      <p:sp>
-        <p:nvSpPr>
-          <p:cNvPr id="60" name="角丸四角形 59"/>
+      <p:sp>
+        <p:nvSpPr>
+          <p:cNvPr id="38" name="角丸四角形 37"/>
           <p:cNvSpPr/>
           <p:nvPr/>
         </p:nvSpPr>
         <p:spPr>
           <a:xfrm>
-            <a:off x="5454062" y="2118039"/>
-            <a:ext cx="918138" cy="479649"/>
+            <a:off x="5404411" y="3284984"/>
+            <a:ext cx="948328" cy="541380"/>
           </a:xfrm>
           <a:prstGeom prst="roundRect">
             <a:avLst/>
@@ -8248,48 +8128,292 @@
           </a:p>
         </p:txBody>
       </p:sp>
-      <p:sp>
-        <p:nvSpPr>
-          <p:cNvPr id="61" name="テキスト ボックス 60"/>
+      <p:pic>
+        <p:nvPicPr>
+          <p:cNvPr id="41" name="Picture 6" descr="C:\Users\knimura\AppData\Local\Microsoft\Windows\Temporary Internet Files\Content.IE5\2T0DMC6R\lgi01a201311262300[1].jpg"/>
+          <p:cNvPicPr>
+            <a:picLocks noChangeAspect="1" noChangeArrowheads="1"/>
+          </p:cNvPicPr>
+          <p:nvPr/>
+        </p:nvPicPr>
+        <p:blipFill>
+          <a:blip r:embed="rId2" cstate="print">
+            <a:extLst>
+              <a:ext uri="{28A0092B-C50C-407E-A947-70E740481C1C}">
+                <a14:useLocalDpi xmlns="" xmlns:a14="http://schemas.microsoft.com/office/drawing/2010/main" val="0"/>
+              </a:ext>
+            </a:extLst>
+          </a:blip>
+          <a:srcRect/>
+          <a:stretch>
+            <a:fillRect/>
+          </a:stretch>
+        </p:blipFill>
+        <p:spPr bwMode="auto">
+          <a:xfrm>
+            <a:off x="5574322" y="3501161"/>
+            <a:ext cx="608505" cy="273946"/>
+          </a:xfrm>
+          <a:prstGeom prst="rect">
+            <a:avLst/>
+          </a:prstGeom>
+          <a:noFill/>
+          <a:extLst>
+            <a:ext uri="{909E8E84-426E-40DD-AFC4-6F175D3DCCD1}">
+              <a14:hiddenFill xmlns="" xmlns:a14="http://schemas.microsoft.com/office/drawing/2010/main">
+                <a:solidFill>
+                  <a:srgbClr val="FFFFFF"/>
+                </a:solidFill>
+              </a14:hiddenFill>
+            </a:ext>
+          </a:extLst>
+        </p:spPr>
+      </p:pic>
+      <p:sp>
+        <p:nvSpPr>
+          <p:cNvPr id="45" name="テキスト ボックス 44"/>
           <p:cNvSpPr txBox="1"/>
           <p:nvPr/>
         </p:nvSpPr>
         <p:spPr>
           <a:xfrm>
-            <a:off x="5590543" y="2244578"/>
-            <a:ext cx="645177" cy="215444"/>
-          </a:xfrm>
-          <a:prstGeom prst="rect">
+            <a:off x="4474014" y="3259865"/>
+            <a:ext cx="506869" cy="307777"/>
+          </a:xfrm>
+          <a:prstGeom prst="rect">
+            <a:avLst/>
+          </a:prstGeom>
+          <a:noFill/>
+        </p:spPr>
+        <p:txBody>
+          <a:bodyPr wrap="none" rtlCol="0">
+            <a:spAutoFit/>
+          </a:bodyPr>
+          <a:lstStyle/>
+          <a:p>
+            <a:pPr algn="ctr"/>
+            <a:r>
+              <a:rPr kumimoji="1" lang="en-US" altLang="ja-JP" sz="1400" dirty="0" smtClean="0"/>
+              <a:t>DCU</a:t>
+            </a:r>
+            <a:endParaRPr kumimoji="1" lang="ja-JP" altLang="en-US" sz="1400" dirty="0"/>
+          </a:p>
+        </p:txBody>
+      </p:sp>
+      <p:sp>
+        <p:nvSpPr>
+          <p:cNvPr id="46" name="テキスト ボックス 45"/>
+          <p:cNvSpPr txBox="1"/>
+          <p:nvPr/>
+        </p:nvSpPr>
+        <p:spPr>
+          <a:xfrm>
+            <a:off x="5467340" y="3259864"/>
+            <a:ext cx="822469" cy="307777"/>
+          </a:xfrm>
+          <a:prstGeom prst="rect">
+            <a:avLst/>
+          </a:prstGeom>
+          <a:noFill/>
+        </p:spPr>
+        <p:txBody>
+          <a:bodyPr wrap="none" rtlCol="0">
+            <a:spAutoFit/>
+          </a:bodyPr>
+          <a:lstStyle/>
+          <a:p>
+            <a:r>
+              <a:rPr kumimoji="1" lang="en-US" altLang="ja-JP" sz="1400" dirty="0" smtClean="0"/>
+              <a:t>Gateway</a:t>
+            </a:r>
+            <a:endParaRPr kumimoji="1" lang="ja-JP" altLang="en-US" sz="1400" dirty="0"/>
+          </a:p>
+        </p:txBody>
+      </p:sp>
+      <p:sp>
+        <p:nvSpPr>
+          <p:cNvPr id="53" name="テキスト ボックス 52"/>
+          <p:cNvSpPr txBox="1"/>
+          <p:nvPr/>
+        </p:nvSpPr>
+        <p:spPr>
+          <a:xfrm>
+            <a:off x="4278218" y="4438088"/>
+            <a:ext cx="482312" cy="307777"/>
+          </a:xfrm>
+          <a:prstGeom prst="rect">
+            <a:avLst/>
+          </a:prstGeom>
+          <a:noFill/>
+        </p:spPr>
+        <p:txBody>
+          <a:bodyPr wrap="none" rtlCol="0">
+            <a:spAutoFit/>
+          </a:bodyPr>
+          <a:lstStyle/>
+          <a:p>
+            <a:pPr algn="ctr"/>
+            <a:r>
+              <a:rPr kumimoji="1" lang="en-US" altLang="ja-JP" sz="1400" dirty="0" smtClean="0"/>
+              <a:t>ECU</a:t>
+            </a:r>
+            <a:endParaRPr kumimoji="1" lang="ja-JP" altLang="en-US" sz="1400" dirty="0"/>
+          </a:p>
+        </p:txBody>
+      </p:sp>
+      <p:sp>
+        <p:nvSpPr>
+          <p:cNvPr id="57" name="テキスト ボックス 56"/>
+          <p:cNvSpPr txBox="1"/>
+          <p:nvPr/>
+        </p:nvSpPr>
+        <p:spPr>
+          <a:xfrm>
+            <a:off x="3399706" y="4431043"/>
+            <a:ext cx="482312" cy="307777"/>
+          </a:xfrm>
+          <a:prstGeom prst="rect">
+            <a:avLst/>
+          </a:prstGeom>
+          <a:noFill/>
+        </p:spPr>
+        <p:txBody>
+          <a:bodyPr wrap="none" rtlCol="0">
+            <a:spAutoFit/>
+          </a:bodyPr>
+          <a:lstStyle/>
+          <a:p>
+            <a:pPr algn="ctr"/>
+            <a:r>
+              <a:rPr kumimoji="1" lang="en-US" altLang="ja-JP" sz="1400" dirty="0" smtClean="0"/>
+              <a:t>ECU</a:t>
+            </a:r>
+            <a:endParaRPr kumimoji="1" lang="ja-JP" altLang="en-US" sz="1400" dirty="0"/>
+          </a:p>
+        </p:txBody>
+      </p:sp>
+      <p:sp>
+        <p:nvSpPr>
+          <p:cNvPr id="58" name="テキスト ボックス 57"/>
+          <p:cNvSpPr txBox="1"/>
+          <p:nvPr/>
+        </p:nvSpPr>
+        <p:spPr>
+          <a:xfrm>
+            <a:off x="2565679" y="4438088"/>
+            <a:ext cx="482312" cy="307777"/>
+          </a:xfrm>
+          <a:prstGeom prst="rect">
+            <a:avLst/>
+          </a:prstGeom>
+          <a:noFill/>
+        </p:spPr>
+        <p:txBody>
+          <a:bodyPr wrap="none" rtlCol="0">
+            <a:spAutoFit/>
+          </a:bodyPr>
+          <a:lstStyle/>
+          <a:p>
+            <a:pPr algn="ctr"/>
+            <a:r>
+              <a:rPr kumimoji="1" lang="en-US" altLang="ja-JP" sz="1400" dirty="0" smtClean="0"/>
+              <a:t>ECU</a:t>
+            </a:r>
+            <a:endParaRPr kumimoji="1" lang="ja-JP" altLang="en-US" sz="1400" dirty="0"/>
+          </a:p>
+        </p:txBody>
+      </p:sp>
+      <p:sp>
+        <p:nvSpPr>
+          <p:cNvPr id="22" name="雲 21"/>
+          <p:cNvSpPr/>
+          <p:nvPr/>
+        </p:nvSpPr>
+        <p:spPr>
+          <a:xfrm>
+            <a:off x="4938736" y="1858582"/>
+            <a:ext cx="1927995" cy="1122912"/>
+          </a:xfrm>
+          <a:prstGeom prst="cloud">
             <a:avLst/>
           </a:prstGeom>
           <a:solidFill>
             <a:schemeClr val="bg1"/>
           </a:solidFill>
-        </p:spPr>
-        <p:txBody>
-          <a:bodyPr wrap="none" lIns="0" tIns="0" rIns="0" bIns="0" rtlCol="0">
-            <a:spAutoFit/>
-          </a:bodyPr>
-          <a:lstStyle/>
-          <a:p>
-            <a:r>
-              <a:rPr lang="en-US" altLang="ja-JP" sz="1400" dirty="0" smtClean="0"/>
-              <a:t>Services</a:t>
-            </a:r>
-            <a:endParaRPr kumimoji="1" lang="ja-JP" altLang="en-US" sz="1400" dirty="0"/>
-          </a:p>
-        </p:txBody>
-      </p:sp>
-      <p:sp>
-        <p:nvSpPr>
-          <p:cNvPr id="38" name="角丸四角形 37"/>
+          <a:ln>
+            <a:solidFill>
+              <a:srgbClr val="385D8A"/>
+            </a:solidFill>
+          </a:ln>
+        </p:spPr>
+        <p:style>
+          <a:lnRef idx="2">
+            <a:schemeClr val="accent1">
+              <a:shade val="50000"/>
+            </a:schemeClr>
+          </a:lnRef>
+          <a:fillRef idx="1">
+            <a:schemeClr val="accent1"/>
+          </a:fillRef>
+          <a:effectRef idx="0">
+            <a:schemeClr val="accent1"/>
+          </a:effectRef>
+          <a:fontRef idx="minor">
+            <a:schemeClr val="lt1"/>
+          </a:fontRef>
+        </p:style>
+        <p:txBody>
+          <a:bodyPr rtlCol="0" anchor="ctr"/>
+          <a:lstStyle/>
+          <a:p>
+            <a:pPr algn="ctr"/>
+            <a:endParaRPr kumimoji="1" lang="ja-JP" altLang="en-US"/>
+          </a:p>
+        </p:txBody>
+      </p:sp>
+      <p:cxnSp>
+        <p:nvCxnSpPr>
+          <p:cNvPr id="56" name="直線矢印コネクタ 55"/>
+          <p:cNvCxnSpPr/>
+          <p:nvPr/>
+        </p:nvCxnSpPr>
+        <p:spPr>
+          <a:xfrm flipH="1" flipV="1">
+            <a:off x="5330115" y="3133587"/>
+            <a:ext cx="404444" cy="7381"/>
+          </a:xfrm>
+          <a:prstGeom prst="straightConnector1">
+            <a:avLst/>
+          </a:prstGeom>
+          <a:ln>
+            <a:tailEnd type="arrow"/>
+          </a:ln>
+        </p:spPr>
+        <p:style>
+          <a:lnRef idx="1">
+            <a:schemeClr val="accent1"/>
+          </a:lnRef>
+          <a:fillRef idx="0">
+            <a:schemeClr val="accent1"/>
+          </a:fillRef>
+          <a:effectRef idx="0">
+            <a:schemeClr val="accent1"/>
+          </a:effectRef>
+          <a:fontRef idx="minor">
+            <a:schemeClr val="tx1"/>
+          </a:fontRef>
+        </p:style>
+      </p:cxnSp>
+      <p:sp>
+        <p:nvSpPr>
+          <p:cNvPr id="60" name="角丸四角形 59"/>
           <p:cNvSpPr/>
           <p:nvPr/>
         </p:nvSpPr>
         <p:spPr>
           <a:xfrm>
-            <a:off x="5404411" y="3284984"/>
-            <a:ext cx="948328" cy="541380"/>
+            <a:off x="5454062" y="2165664"/>
+            <a:ext cx="918138" cy="479649"/>
           </a:xfrm>
           <a:prstGeom prst="roundRect">
             <a:avLst/>
@@ -8330,230 +8454,39 @@
           </a:p>
         </p:txBody>
       </p:sp>
-      <p:pic>
-        <p:nvPicPr>
-          <p:cNvPr id="41" name="Picture 6" descr="C:\Users\knimura\AppData\Local\Microsoft\Windows\Temporary Internet Files\Content.IE5\2T0DMC6R\lgi01a201311262300[1].jpg"/>
-          <p:cNvPicPr>
-            <a:picLocks noChangeAspect="1" noChangeArrowheads="1"/>
-          </p:cNvPicPr>
-          <p:nvPr/>
-        </p:nvPicPr>
-        <p:blipFill>
-          <a:blip r:embed="rId2" cstate="print">
-            <a:extLst>
-              <a:ext uri="{28A0092B-C50C-407E-A947-70E740481C1C}">
-                <a14:useLocalDpi xmlns:a14="http://schemas.microsoft.com/office/drawing/2010/main" xmlns="" val="0"/>
-              </a:ext>
-            </a:extLst>
-          </a:blip>
-          <a:srcRect/>
-          <a:stretch>
-            <a:fillRect/>
-          </a:stretch>
-        </p:blipFill>
-        <p:spPr bwMode="auto">
-          <a:xfrm>
-            <a:off x="5517533" y="3482111"/>
-            <a:ext cx="608505" cy="273946"/>
-          </a:xfrm>
-          <a:prstGeom prst="rect">
-            <a:avLst/>
-          </a:prstGeom>
-          <a:noFill/>
-          <a:extLst>
-            <a:ext uri="{909E8E84-426E-40DD-AFC4-6F175D3DCCD1}">
-              <a14:hiddenFill xmlns:a14="http://schemas.microsoft.com/office/drawing/2010/main" xmlns="">
-                <a:solidFill>
-                  <a:srgbClr val="FFFFFF"/>
-                </a:solidFill>
-              </a14:hiddenFill>
-            </a:ext>
-          </a:extLst>
-        </p:spPr>
-      </p:pic>
-      <p:sp>
-        <p:nvSpPr>
-          <p:cNvPr id="45" name="テキスト ボックス 44"/>
+      <p:sp>
+        <p:nvSpPr>
+          <p:cNvPr id="61" name="テキスト ボックス 60"/>
           <p:cNvSpPr txBox="1"/>
           <p:nvPr/>
         </p:nvSpPr>
         <p:spPr>
           <a:xfrm>
-            <a:off x="4422056" y="3240815"/>
-            <a:ext cx="545342" cy="307777"/>
-          </a:xfrm>
-          <a:prstGeom prst="rect">
-            <a:avLst/>
-          </a:prstGeom>
-          <a:noFill/>
-        </p:spPr>
-        <p:txBody>
-          <a:bodyPr wrap="none" rtlCol="0">
+            <a:off x="5615742" y="2292203"/>
+            <a:ext cx="594778" cy="215444"/>
+          </a:xfrm>
+          <a:prstGeom prst="rect">
+            <a:avLst/>
+          </a:prstGeom>
+          <a:solidFill>
+            <a:schemeClr val="bg1"/>
+          </a:solidFill>
+        </p:spPr>
+        <p:txBody>
+          <a:bodyPr wrap="none" lIns="0" tIns="0" rIns="0" bIns="0" rtlCol="0">
             <a:spAutoFit/>
           </a:bodyPr>
           <a:lstStyle/>
           <a:p>
-            <a:r>
-              <a:rPr kumimoji="1" lang="en-US" altLang="ja-JP" sz="1400" dirty="0" smtClean="0"/>
-              <a:t>DCU</a:t>
+            <a:pPr algn="ctr"/>
+            <a:r>
+              <a:rPr lang="en-US" altLang="ja-JP" sz="1400" dirty="0" smtClean="0"/>
+              <a:t>Services</a:t>
             </a:r>
             <a:endParaRPr kumimoji="1" lang="ja-JP" altLang="en-US" sz="1400" dirty="0"/>
           </a:p>
         </p:txBody>
       </p:sp>
-      <p:sp>
-        <p:nvSpPr>
-          <p:cNvPr id="46" name="テキスト ボックス 45"/>
-          <p:cNvSpPr txBox="1"/>
-          <p:nvPr/>
-        </p:nvSpPr>
-        <p:spPr>
-          <a:xfrm>
-            <a:off x="5467340" y="3240814"/>
-            <a:ext cx="822469" cy="307777"/>
-          </a:xfrm>
-          <a:prstGeom prst="rect">
-            <a:avLst/>
-          </a:prstGeom>
-          <a:noFill/>
-        </p:spPr>
-        <p:txBody>
-          <a:bodyPr wrap="none" rtlCol="0">
-            <a:spAutoFit/>
-          </a:bodyPr>
-          <a:lstStyle/>
-          <a:p>
-            <a:r>
-              <a:rPr kumimoji="1" lang="en-US" altLang="ja-JP" sz="1400" dirty="0" smtClean="0"/>
-              <a:t>Gateway</a:t>
-            </a:r>
-            <a:endParaRPr kumimoji="1" lang="ja-JP" altLang="en-US" sz="1400" dirty="0"/>
-          </a:p>
-        </p:txBody>
-      </p:sp>
-      <p:sp>
-        <p:nvSpPr>
-          <p:cNvPr id="53" name="テキスト ボックス 52"/>
-          <p:cNvSpPr txBox="1"/>
-          <p:nvPr/>
-        </p:nvSpPr>
-        <p:spPr>
-          <a:xfrm>
-            <a:off x="4264336" y="4399988"/>
-            <a:ext cx="510076" cy="307777"/>
-          </a:xfrm>
-          <a:prstGeom prst="rect">
-            <a:avLst/>
-          </a:prstGeom>
-          <a:noFill/>
-        </p:spPr>
-        <p:txBody>
-          <a:bodyPr wrap="none" rtlCol="0">
-            <a:spAutoFit/>
-          </a:bodyPr>
-          <a:lstStyle/>
-          <a:p>
-            <a:r>
-              <a:rPr kumimoji="1" lang="en-US" altLang="ja-JP" sz="1400" dirty="0" smtClean="0"/>
-              <a:t>ECU</a:t>
-            </a:r>
-            <a:endParaRPr kumimoji="1" lang="ja-JP" altLang="en-US" sz="1400" dirty="0"/>
-          </a:p>
-        </p:txBody>
-      </p:sp>
-      <p:sp>
-        <p:nvSpPr>
-          <p:cNvPr id="57" name="テキスト ボックス 56"/>
-          <p:cNvSpPr txBox="1"/>
-          <p:nvPr/>
-        </p:nvSpPr>
-        <p:spPr>
-          <a:xfrm>
-            <a:off x="3381605" y="4392943"/>
-            <a:ext cx="510076" cy="307777"/>
-          </a:xfrm>
-          <a:prstGeom prst="rect">
-            <a:avLst/>
-          </a:prstGeom>
-          <a:noFill/>
-        </p:spPr>
-        <p:txBody>
-          <a:bodyPr wrap="none" rtlCol="0">
-            <a:spAutoFit/>
-          </a:bodyPr>
-          <a:lstStyle/>
-          <a:p>
-            <a:r>
-              <a:rPr kumimoji="1" lang="en-US" altLang="ja-JP" sz="1400" dirty="0" smtClean="0"/>
-              <a:t>ECU</a:t>
-            </a:r>
-            <a:endParaRPr kumimoji="1" lang="ja-JP" altLang="en-US" sz="1400" dirty="0"/>
-          </a:p>
-        </p:txBody>
-      </p:sp>
-      <p:sp>
-        <p:nvSpPr>
-          <p:cNvPr id="58" name="テキスト ボックス 57"/>
-          <p:cNvSpPr txBox="1"/>
-          <p:nvPr/>
-        </p:nvSpPr>
-        <p:spPr>
-          <a:xfrm>
-            <a:off x="2549658" y="4399988"/>
-            <a:ext cx="510076" cy="307777"/>
-          </a:xfrm>
-          <a:prstGeom prst="rect">
-            <a:avLst/>
-          </a:prstGeom>
-          <a:noFill/>
-        </p:spPr>
-        <p:txBody>
-          <a:bodyPr wrap="none" rtlCol="0">
-            <a:spAutoFit/>
-          </a:bodyPr>
-          <a:lstStyle/>
-          <a:p>
-            <a:r>
-              <a:rPr kumimoji="1" lang="en-US" altLang="ja-JP" sz="1400" dirty="0" smtClean="0"/>
-              <a:t>ECU</a:t>
-            </a:r>
-            <a:endParaRPr kumimoji="1" lang="ja-JP" altLang="en-US" sz="1400" dirty="0"/>
-          </a:p>
-        </p:txBody>
-      </p:sp>
-      <p:cxnSp>
-        <p:nvCxnSpPr>
-          <p:cNvPr id="25" name="直線矢印コネクタ 24"/>
-          <p:cNvCxnSpPr/>
-          <p:nvPr/>
-        </p:nvCxnSpPr>
-        <p:spPr>
-          <a:xfrm flipV="1">
-            <a:off x="6094599" y="3044536"/>
-            <a:ext cx="0" cy="1214844"/>
-          </a:xfrm>
-          <a:prstGeom prst="straightConnector1">
-            <a:avLst/>
-          </a:prstGeom>
-          <a:ln>
-            <a:tailEnd type="arrow"/>
-          </a:ln>
-        </p:spPr>
-        <p:style>
-          <a:lnRef idx="1">
-            <a:schemeClr val="accent1"/>
-          </a:lnRef>
-          <a:fillRef idx="0">
-            <a:schemeClr val="accent1"/>
-          </a:fillRef>
-          <a:effectRef idx="0">
-            <a:schemeClr val="accent1"/>
-          </a:effectRef>
-          <a:fontRef idx="minor">
-            <a:schemeClr val="tx1"/>
-          </a:fontRef>
-        </p:style>
-      </p:cxnSp>
       <p:cxnSp>
         <p:nvCxnSpPr>
           <p:cNvPr id="29" name="直線コネクタ 28"/>
@@ -8587,7 +8520,7 @@
     </p:spTree>
     <p:extLst>
       <p:ext uri="{BB962C8B-B14F-4D97-AF65-F5344CB8AC3E}">
-        <p14:creationId xmlns:p14="http://schemas.microsoft.com/office/powerpoint/2010/main" xmlns="" val="920231567"/>
+        <p14:creationId xmlns="" xmlns:p14="http://schemas.microsoft.com/office/powerpoint/2010/main" val="920231567"/>
       </p:ext>
     </p:extLst>
   </p:cSld>

</xml_diff>